<commit_message>
SQL - DB Fiddle Work
</commit_message>
<xml_diff>
--- a/ZTM_SQL_Course/MJH_SQL_and_Databases_Course_Notes.pptx
+++ b/ZTM_SQL_Course/MJH_SQL_and_Databases_Course_Notes.pptx
@@ -10,13 +10,16 @@
     <p:sldId id="267" r:id="rId4"/>
     <p:sldId id="268" r:id="rId5"/>
     <p:sldId id="259" r:id="rId6"/>
-    <p:sldId id="260" r:id="rId7"/>
-    <p:sldId id="261" r:id="rId8"/>
-    <p:sldId id="262" r:id="rId9"/>
-    <p:sldId id="263" r:id="rId10"/>
-    <p:sldId id="264" r:id="rId11"/>
-    <p:sldId id="265" r:id="rId12"/>
-    <p:sldId id="266" r:id="rId13"/>
+    <p:sldId id="269" r:id="rId7"/>
+    <p:sldId id="270" r:id="rId8"/>
+    <p:sldId id="271" r:id="rId9"/>
+    <p:sldId id="260" r:id="rId10"/>
+    <p:sldId id="261" r:id="rId11"/>
+    <p:sldId id="262" r:id="rId12"/>
+    <p:sldId id="263" r:id="rId13"/>
+    <p:sldId id="264" r:id="rId14"/>
+    <p:sldId id="265" r:id="rId15"/>
+    <p:sldId id="266" r:id="rId16"/>
   </p:sldIdLst>
   <p:sldSz cx="12192000" cy="6858000"/>
   <p:notesSz cx="6858000" cy="9144000"/>
@@ -3884,31 +3887,8 @@
                 <a:ea typeface="+mn-ea"/>
                 <a:cs typeface="+mn-cs"/>
               </a:rPr>
-              <a:t>Section </a:t>
-            </a:r>
-            <a:r>
-              <a:rPr lang="en-GB" sz="3200" dirty="0">
-                <a:solidFill>
-                  <a:prstClr val="black"/>
-                </a:solidFill>
-                <a:latin typeface="Calibri" panose="020F0502020204030204"/>
-              </a:rPr>
-              <a:t>8</a:t>
-            </a:r>
-            <a:endParaRPr kumimoji="0" lang="en-GB" sz="3200" i="0" u="none" strike="noStrike" kern="1200" cap="none" spc="0" normalizeH="0" baseline="0" noProof="0" dirty="0">
-              <a:ln>
-                <a:noFill/>
-              </a:ln>
-              <a:solidFill>
-                <a:prstClr val="black"/>
-              </a:solidFill>
-              <a:effectLst/>
-              <a:uLnTx/>
-              <a:uFillTx/>
-              <a:latin typeface="Calibri" panose="020F0502020204030204"/>
-              <a:ea typeface="+mn-ea"/>
-              <a:cs typeface="+mn-cs"/>
-            </a:endParaRPr>
+              <a:t>Section 5</a:t>
+            </a:r>
           </a:p>
           <a:p>
             <a:pPr marL="0" marR="0" lvl="0" indent="0" algn="ctr" defTabSz="914400" rtl="0" eaLnBrk="1" fontAlgn="auto" latinLnBrk="0" hangingPunct="1">
@@ -3976,7 +3956,7 @@
                 <a:ea typeface="+mn-ea"/>
                 <a:cs typeface="+mn-cs"/>
               </a:rPr>
-              <a:t>Solving the Mystery</a:t>
+              <a:t>SQL Deep Dive</a:t>
             </a:r>
           </a:p>
         </p:txBody>
@@ -3984,7 +3964,7 @@
     </p:spTree>
     <p:extLst>
       <p:ext uri="{BB962C8B-B14F-4D97-AF65-F5344CB8AC3E}">
-        <p14:creationId xmlns:p14="http://schemas.microsoft.com/office/powerpoint/2010/main" val="1279348573"/>
+        <p14:creationId xmlns:p14="http://schemas.microsoft.com/office/powerpoint/2010/main" val="3456612687"/>
       </p:ext>
     </p:extLst>
   </p:cSld>
@@ -4222,31 +4202,8 @@
                 <a:ea typeface="+mn-ea"/>
                 <a:cs typeface="+mn-cs"/>
               </a:rPr>
-              <a:t>Section </a:t>
-            </a:r>
-            <a:r>
-              <a:rPr lang="en-GB" sz="3200" dirty="0">
-                <a:solidFill>
-                  <a:prstClr val="black"/>
-                </a:solidFill>
-                <a:latin typeface="Calibri" panose="020F0502020204030204"/>
-              </a:rPr>
-              <a:t>9</a:t>
-            </a:r>
-            <a:endParaRPr kumimoji="0" lang="en-GB" sz="3200" i="0" u="none" strike="noStrike" kern="1200" cap="none" spc="0" normalizeH="0" baseline="0" noProof="0" dirty="0">
-              <a:ln>
-                <a:noFill/>
-              </a:ln>
-              <a:solidFill>
-                <a:prstClr val="black"/>
-              </a:solidFill>
-              <a:effectLst/>
-              <a:uLnTx/>
-              <a:uFillTx/>
-              <a:latin typeface="Calibri" panose="020F0502020204030204"/>
-              <a:ea typeface="+mn-ea"/>
-              <a:cs typeface="+mn-cs"/>
-            </a:endParaRPr>
+              <a:t>Section 6</a:t>
+            </a:r>
           </a:p>
           <a:p>
             <a:pPr marL="0" marR="0" lvl="0" indent="0" algn="ctr" defTabSz="914400" rtl="0" eaLnBrk="1" fontAlgn="auto" latinLnBrk="0" hangingPunct="1">
@@ -4314,6 +4271,997 @@
                 <a:ea typeface="+mn-ea"/>
                 <a:cs typeface="+mn-cs"/>
               </a:rPr>
+              <a:t>Advanced SQL</a:t>
+            </a:r>
+          </a:p>
+        </p:txBody>
+      </p:sp>
+    </p:spTree>
+    <p:extLst>
+      <p:ext uri="{BB962C8B-B14F-4D97-AF65-F5344CB8AC3E}">
+        <p14:creationId xmlns:p14="http://schemas.microsoft.com/office/powerpoint/2010/main" val="2985149612"/>
+      </p:ext>
+    </p:extLst>
+  </p:cSld>
+  <p:clrMapOvr>
+    <a:masterClrMapping/>
+  </p:clrMapOvr>
+</p:sld>
+</file>
+
+<file path=ppt/slides/slide12.xml><?xml version="1.0" encoding="utf-8"?>
+<p:sld xmlns:a="http://schemas.openxmlformats.org/drawingml/2006/main" xmlns:r="http://schemas.openxmlformats.org/officeDocument/2006/relationships" xmlns:p="http://schemas.openxmlformats.org/presentationml/2006/main">
+  <p:cSld>
+    <p:spTree>
+      <p:nvGrpSpPr>
+        <p:cNvPr id="1" name=""/>
+        <p:cNvGrpSpPr/>
+        <p:nvPr/>
+      </p:nvGrpSpPr>
+      <p:grpSpPr>
+        <a:xfrm>
+          <a:off x="0" y="0"/>
+          <a:ext cx="0" cy="0"/>
+          <a:chOff x="0" y="0"/>
+          <a:chExt cx="0" cy="0"/>
+        </a:xfrm>
+      </p:grpSpPr>
+      <p:pic>
+        <p:nvPicPr>
+          <p:cNvPr id="2" name="Picture 2" descr="What is SQL? - Tech Monitor">
+            <a:extLst>
+              <a:ext uri="{FF2B5EF4-FFF2-40B4-BE49-F238E27FC236}">
+                <a16:creationId xmlns:a16="http://schemas.microsoft.com/office/drawing/2014/main" id="{6B52F4A0-16E8-43E9-BF09-6D67DF948D7E}"/>
+              </a:ext>
+            </a:extLst>
+          </p:cNvPr>
+          <p:cNvPicPr>
+            <a:picLocks noChangeAspect="1" noChangeArrowheads="1"/>
+          </p:cNvPicPr>
+          <p:nvPr/>
+        </p:nvPicPr>
+        <p:blipFill rotWithShape="1">
+          <a:blip r:embed="rId2">
+            <a:extLst>
+              <a:ext uri="{28A0092B-C50C-407E-A947-70E740481C1C}">
+                <a14:useLocalDpi xmlns:a14="http://schemas.microsoft.com/office/drawing/2010/main" val="0"/>
+              </a:ext>
+            </a:extLst>
+          </a:blip>
+          <a:srcRect l="26148" r="27610"/>
+          <a:stretch/>
+        </p:blipFill>
+        <p:spPr bwMode="auto">
+          <a:xfrm>
+            <a:off x="136857" y="84112"/>
+            <a:ext cx="689376" cy="782667"/>
+          </a:xfrm>
+          <a:prstGeom prst="rect">
+            <a:avLst/>
+          </a:prstGeom>
+          <a:noFill/>
+          <a:extLst>
+            <a:ext uri="{909E8E84-426E-40DD-AFC4-6F175D3DCCD1}">
+              <a14:hiddenFill xmlns:a14="http://schemas.microsoft.com/office/drawing/2010/main">
+                <a:solidFill>
+                  <a:srgbClr val="FFFFFF"/>
+                </a:solidFill>
+              </a14:hiddenFill>
+            </a:ext>
+          </a:extLst>
+        </p:spPr>
+      </p:pic>
+      <p:cxnSp>
+        <p:nvCxnSpPr>
+          <p:cNvPr id="5" name="Straight Connector 4">
+            <a:extLst>
+              <a:ext uri="{FF2B5EF4-FFF2-40B4-BE49-F238E27FC236}">
+                <a16:creationId xmlns:a16="http://schemas.microsoft.com/office/drawing/2014/main" id="{A8BE4EF8-406C-4035-940C-AB752B29BA18}"/>
+              </a:ext>
+            </a:extLst>
+          </p:cNvPr>
+          <p:cNvCxnSpPr/>
+          <p:nvPr/>
+        </p:nvCxnSpPr>
+        <p:spPr>
+          <a:xfrm>
+            <a:off x="99755" y="955963"/>
+            <a:ext cx="11953701" cy="0"/>
+          </a:xfrm>
+          <a:prstGeom prst="line">
+            <a:avLst/>
+          </a:prstGeom>
+          <a:ln w="19050">
+            <a:solidFill>
+              <a:srgbClr val="0072C6"/>
+            </a:solidFill>
+          </a:ln>
+        </p:spPr>
+        <p:style>
+          <a:lnRef idx="1">
+            <a:schemeClr val="accent1"/>
+          </a:lnRef>
+          <a:fillRef idx="0">
+            <a:schemeClr val="accent1"/>
+          </a:fillRef>
+          <a:effectRef idx="0">
+            <a:schemeClr val="accent1"/>
+          </a:effectRef>
+          <a:fontRef idx="minor">
+            <a:schemeClr val="tx1"/>
+          </a:fontRef>
+        </p:style>
+      </p:cxnSp>
+      <p:sp>
+        <p:nvSpPr>
+          <p:cNvPr id="6" name="TextBox 5">
+            <a:extLst>
+              <a:ext uri="{FF2B5EF4-FFF2-40B4-BE49-F238E27FC236}">
+                <a16:creationId xmlns:a16="http://schemas.microsoft.com/office/drawing/2014/main" id="{4A5E75BC-B6AC-4138-AB81-9DEC0096C5A8}"/>
+              </a:ext>
+            </a:extLst>
+          </p:cNvPr>
+          <p:cNvSpPr txBox="1"/>
+          <p:nvPr/>
+        </p:nvSpPr>
+        <p:spPr>
+          <a:xfrm>
+            <a:off x="914402" y="191193"/>
+            <a:ext cx="3483032" cy="646331"/>
+          </a:xfrm>
+          <a:prstGeom prst="rect">
+            <a:avLst/>
+          </a:prstGeom>
+          <a:noFill/>
+        </p:spPr>
+        <p:txBody>
+          <a:bodyPr wrap="square" rtlCol="0">
+            <a:spAutoFit/>
+          </a:bodyPr>
+          <a:lstStyle/>
+          <a:p>
+            <a:pPr marL="0" marR="0" lvl="0" indent="0" algn="l" defTabSz="914400" rtl="0" eaLnBrk="1" fontAlgn="auto" latinLnBrk="0" hangingPunct="1">
+              <a:lnSpc>
+                <a:spcPct val="100000"/>
+              </a:lnSpc>
+              <a:spcBef>
+                <a:spcPts val="0"/>
+              </a:spcBef>
+              <a:spcAft>
+                <a:spcPts val="0"/>
+              </a:spcAft>
+              <a:buClrTx/>
+              <a:buSzTx/>
+              <a:buFontTx/>
+              <a:buNone/>
+              <a:tabLst/>
+              <a:defRPr/>
+            </a:pPr>
+            <a:r>
+              <a:rPr kumimoji="0" lang="en-GB" sz="1800" b="0" i="0" u="none" strike="noStrike" kern="1200" cap="none" spc="0" normalizeH="0" baseline="0" noProof="0" dirty="0">
+                <a:ln>
+                  <a:noFill/>
+                </a:ln>
+                <a:solidFill>
+                  <a:prstClr val="black"/>
+                </a:solidFill>
+                <a:effectLst/>
+                <a:uLnTx/>
+                <a:uFillTx/>
+                <a:latin typeface="Calibri" panose="020F0502020204030204"/>
+                <a:ea typeface="+mn-ea"/>
+                <a:cs typeface="+mn-cs"/>
+              </a:rPr>
+              <a:t>Complete SQL and Database Bootcamp: Zero to Mastery</a:t>
+            </a:r>
+          </a:p>
+        </p:txBody>
+      </p:sp>
+      <p:sp>
+        <p:nvSpPr>
+          <p:cNvPr id="8" name="TextBox 7">
+            <a:extLst>
+              <a:ext uri="{FF2B5EF4-FFF2-40B4-BE49-F238E27FC236}">
+                <a16:creationId xmlns:a16="http://schemas.microsoft.com/office/drawing/2014/main" id="{C61B684E-FDA7-4625-9CC3-79C17CC59ED7}"/>
+              </a:ext>
+            </a:extLst>
+          </p:cNvPr>
+          <p:cNvSpPr txBox="1"/>
+          <p:nvPr/>
+        </p:nvSpPr>
+        <p:spPr>
+          <a:xfrm>
+            <a:off x="246888" y="2479578"/>
+            <a:ext cx="11576304" cy="1569660"/>
+          </a:xfrm>
+          <a:prstGeom prst="rect">
+            <a:avLst/>
+          </a:prstGeom>
+          <a:noFill/>
+        </p:spPr>
+        <p:txBody>
+          <a:bodyPr wrap="square" rtlCol="0">
+            <a:spAutoFit/>
+          </a:bodyPr>
+          <a:lstStyle/>
+          <a:p>
+            <a:pPr marL="0" marR="0" lvl="0" indent="0" algn="ctr" defTabSz="914400" rtl="0" eaLnBrk="1" fontAlgn="auto" latinLnBrk="0" hangingPunct="1">
+              <a:lnSpc>
+                <a:spcPct val="100000"/>
+              </a:lnSpc>
+              <a:spcBef>
+                <a:spcPts val="0"/>
+              </a:spcBef>
+              <a:spcAft>
+                <a:spcPts val="0"/>
+              </a:spcAft>
+              <a:buClrTx/>
+              <a:buSzTx/>
+              <a:buFontTx/>
+              <a:buNone/>
+              <a:tabLst/>
+              <a:defRPr/>
+            </a:pPr>
+            <a:r>
+              <a:rPr kumimoji="0" lang="en-GB" sz="3200" i="0" u="none" strike="noStrike" kern="1200" cap="none" spc="0" normalizeH="0" baseline="0" noProof="0" dirty="0">
+                <a:ln>
+                  <a:noFill/>
+                </a:ln>
+                <a:solidFill>
+                  <a:prstClr val="black"/>
+                </a:solidFill>
+                <a:effectLst/>
+                <a:uLnTx/>
+                <a:uFillTx/>
+                <a:latin typeface="Calibri" panose="020F0502020204030204"/>
+                <a:ea typeface="+mn-ea"/>
+                <a:cs typeface="+mn-cs"/>
+              </a:rPr>
+              <a:t>Section 7</a:t>
+            </a:r>
+          </a:p>
+          <a:p>
+            <a:pPr marL="0" marR="0" lvl="0" indent="0" algn="ctr" defTabSz="914400" rtl="0" eaLnBrk="1" fontAlgn="auto" latinLnBrk="0" hangingPunct="1">
+              <a:lnSpc>
+                <a:spcPct val="100000"/>
+              </a:lnSpc>
+              <a:spcBef>
+                <a:spcPts val="0"/>
+              </a:spcBef>
+              <a:spcAft>
+                <a:spcPts val="0"/>
+              </a:spcAft>
+              <a:buClrTx/>
+              <a:buSzTx/>
+              <a:buFontTx/>
+              <a:buNone/>
+              <a:tabLst/>
+              <a:defRPr/>
+            </a:pPr>
+            <a:endParaRPr kumimoji="0" lang="en-GB" sz="3200" b="1" i="0" u="none" strike="noStrike" kern="1200" cap="none" spc="0" normalizeH="0" baseline="0" noProof="0" dirty="0">
+              <a:ln>
+                <a:noFill/>
+              </a:ln>
+              <a:solidFill>
+                <a:prstClr val="black"/>
+              </a:solidFill>
+              <a:effectLst/>
+              <a:uLnTx/>
+              <a:uFillTx/>
+              <a:latin typeface="Calibri" panose="020F0502020204030204"/>
+              <a:ea typeface="+mn-ea"/>
+              <a:cs typeface="+mn-cs"/>
+            </a:endParaRPr>
+          </a:p>
+          <a:p>
+            <a:pPr marL="0" marR="0" lvl="0" indent="0" algn="ctr" defTabSz="914400" rtl="0" eaLnBrk="1" fontAlgn="auto" latinLnBrk="0" hangingPunct="1">
+              <a:lnSpc>
+                <a:spcPct val="100000"/>
+              </a:lnSpc>
+              <a:spcBef>
+                <a:spcPts val="0"/>
+              </a:spcBef>
+              <a:spcAft>
+                <a:spcPts val="0"/>
+              </a:spcAft>
+              <a:buClrTx/>
+              <a:buSzTx/>
+              <a:buFontTx/>
+              <a:buNone/>
+              <a:tabLst/>
+              <a:defRPr/>
+            </a:pPr>
+            <a:r>
+              <a:rPr kumimoji="0" lang="en-GB" sz="3200" b="1" i="0" u="none" strike="noStrike" kern="1200" cap="none" spc="0" normalizeH="0" baseline="0" noProof="0" dirty="0">
+                <a:ln>
+                  <a:noFill/>
+                </a:ln>
+                <a:solidFill>
+                  <a:prstClr val="black"/>
+                </a:solidFill>
+                <a:effectLst/>
+                <a:uLnTx/>
+                <a:uFillTx/>
+                <a:latin typeface="Calibri" panose="020F0502020204030204"/>
+                <a:ea typeface="+mn-ea"/>
+                <a:cs typeface="+mn-cs"/>
+              </a:rPr>
+              <a:t>Database Management</a:t>
+            </a:r>
+          </a:p>
+        </p:txBody>
+      </p:sp>
+    </p:spTree>
+    <p:extLst>
+      <p:ext uri="{BB962C8B-B14F-4D97-AF65-F5344CB8AC3E}">
+        <p14:creationId xmlns:p14="http://schemas.microsoft.com/office/powerpoint/2010/main" val="1954899413"/>
+      </p:ext>
+    </p:extLst>
+  </p:cSld>
+  <p:clrMapOvr>
+    <a:masterClrMapping/>
+  </p:clrMapOvr>
+</p:sld>
+</file>
+
+<file path=ppt/slides/slide13.xml><?xml version="1.0" encoding="utf-8"?>
+<p:sld xmlns:a="http://schemas.openxmlformats.org/drawingml/2006/main" xmlns:r="http://schemas.openxmlformats.org/officeDocument/2006/relationships" xmlns:p="http://schemas.openxmlformats.org/presentationml/2006/main">
+  <p:cSld>
+    <p:spTree>
+      <p:nvGrpSpPr>
+        <p:cNvPr id="1" name=""/>
+        <p:cNvGrpSpPr/>
+        <p:nvPr/>
+      </p:nvGrpSpPr>
+      <p:grpSpPr>
+        <a:xfrm>
+          <a:off x="0" y="0"/>
+          <a:ext cx="0" cy="0"/>
+          <a:chOff x="0" y="0"/>
+          <a:chExt cx="0" cy="0"/>
+        </a:xfrm>
+      </p:grpSpPr>
+      <p:pic>
+        <p:nvPicPr>
+          <p:cNvPr id="2" name="Picture 2" descr="What is SQL? - Tech Monitor">
+            <a:extLst>
+              <a:ext uri="{FF2B5EF4-FFF2-40B4-BE49-F238E27FC236}">
+                <a16:creationId xmlns:a16="http://schemas.microsoft.com/office/drawing/2014/main" id="{6B52F4A0-16E8-43E9-BF09-6D67DF948D7E}"/>
+              </a:ext>
+            </a:extLst>
+          </p:cNvPr>
+          <p:cNvPicPr>
+            <a:picLocks noChangeAspect="1" noChangeArrowheads="1"/>
+          </p:cNvPicPr>
+          <p:nvPr/>
+        </p:nvPicPr>
+        <p:blipFill rotWithShape="1">
+          <a:blip r:embed="rId2">
+            <a:extLst>
+              <a:ext uri="{28A0092B-C50C-407E-A947-70E740481C1C}">
+                <a14:useLocalDpi xmlns:a14="http://schemas.microsoft.com/office/drawing/2010/main" val="0"/>
+              </a:ext>
+            </a:extLst>
+          </a:blip>
+          <a:srcRect l="26148" r="27610"/>
+          <a:stretch/>
+        </p:blipFill>
+        <p:spPr bwMode="auto">
+          <a:xfrm>
+            <a:off x="136857" y="84112"/>
+            <a:ext cx="689376" cy="782667"/>
+          </a:xfrm>
+          <a:prstGeom prst="rect">
+            <a:avLst/>
+          </a:prstGeom>
+          <a:noFill/>
+          <a:extLst>
+            <a:ext uri="{909E8E84-426E-40DD-AFC4-6F175D3DCCD1}">
+              <a14:hiddenFill xmlns:a14="http://schemas.microsoft.com/office/drawing/2010/main">
+                <a:solidFill>
+                  <a:srgbClr val="FFFFFF"/>
+                </a:solidFill>
+              </a14:hiddenFill>
+            </a:ext>
+          </a:extLst>
+        </p:spPr>
+      </p:pic>
+      <p:cxnSp>
+        <p:nvCxnSpPr>
+          <p:cNvPr id="5" name="Straight Connector 4">
+            <a:extLst>
+              <a:ext uri="{FF2B5EF4-FFF2-40B4-BE49-F238E27FC236}">
+                <a16:creationId xmlns:a16="http://schemas.microsoft.com/office/drawing/2014/main" id="{A8BE4EF8-406C-4035-940C-AB752B29BA18}"/>
+              </a:ext>
+            </a:extLst>
+          </p:cNvPr>
+          <p:cNvCxnSpPr/>
+          <p:nvPr/>
+        </p:nvCxnSpPr>
+        <p:spPr>
+          <a:xfrm>
+            <a:off x="99755" y="955963"/>
+            <a:ext cx="11953701" cy="0"/>
+          </a:xfrm>
+          <a:prstGeom prst="line">
+            <a:avLst/>
+          </a:prstGeom>
+          <a:ln w="19050">
+            <a:solidFill>
+              <a:srgbClr val="0072C6"/>
+            </a:solidFill>
+          </a:ln>
+        </p:spPr>
+        <p:style>
+          <a:lnRef idx="1">
+            <a:schemeClr val="accent1"/>
+          </a:lnRef>
+          <a:fillRef idx="0">
+            <a:schemeClr val="accent1"/>
+          </a:fillRef>
+          <a:effectRef idx="0">
+            <a:schemeClr val="accent1"/>
+          </a:effectRef>
+          <a:fontRef idx="minor">
+            <a:schemeClr val="tx1"/>
+          </a:fontRef>
+        </p:style>
+      </p:cxnSp>
+      <p:sp>
+        <p:nvSpPr>
+          <p:cNvPr id="6" name="TextBox 5">
+            <a:extLst>
+              <a:ext uri="{FF2B5EF4-FFF2-40B4-BE49-F238E27FC236}">
+                <a16:creationId xmlns:a16="http://schemas.microsoft.com/office/drawing/2014/main" id="{4A5E75BC-B6AC-4138-AB81-9DEC0096C5A8}"/>
+              </a:ext>
+            </a:extLst>
+          </p:cNvPr>
+          <p:cNvSpPr txBox="1"/>
+          <p:nvPr/>
+        </p:nvSpPr>
+        <p:spPr>
+          <a:xfrm>
+            <a:off x="914402" y="191193"/>
+            <a:ext cx="3483032" cy="646331"/>
+          </a:xfrm>
+          <a:prstGeom prst="rect">
+            <a:avLst/>
+          </a:prstGeom>
+          <a:noFill/>
+        </p:spPr>
+        <p:txBody>
+          <a:bodyPr wrap="square" rtlCol="0">
+            <a:spAutoFit/>
+          </a:bodyPr>
+          <a:lstStyle/>
+          <a:p>
+            <a:pPr marL="0" marR="0" lvl="0" indent="0" algn="l" defTabSz="914400" rtl="0" eaLnBrk="1" fontAlgn="auto" latinLnBrk="0" hangingPunct="1">
+              <a:lnSpc>
+                <a:spcPct val="100000"/>
+              </a:lnSpc>
+              <a:spcBef>
+                <a:spcPts val="0"/>
+              </a:spcBef>
+              <a:spcAft>
+                <a:spcPts val="0"/>
+              </a:spcAft>
+              <a:buClrTx/>
+              <a:buSzTx/>
+              <a:buFontTx/>
+              <a:buNone/>
+              <a:tabLst/>
+              <a:defRPr/>
+            </a:pPr>
+            <a:r>
+              <a:rPr kumimoji="0" lang="en-GB" sz="1800" b="0" i="0" u="none" strike="noStrike" kern="1200" cap="none" spc="0" normalizeH="0" baseline="0" noProof="0" dirty="0">
+                <a:ln>
+                  <a:noFill/>
+                </a:ln>
+                <a:solidFill>
+                  <a:prstClr val="black"/>
+                </a:solidFill>
+                <a:effectLst/>
+                <a:uLnTx/>
+                <a:uFillTx/>
+                <a:latin typeface="Calibri" panose="020F0502020204030204"/>
+                <a:ea typeface="+mn-ea"/>
+                <a:cs typeface="+mn-cs"/>
+              </a:rPr>
+              <a:t>Complete SQL and Database Bootcamp: Zero to Mastery</a:t>
+            </a:r>
+          </a:p>
+        </p:txBody>
+      </p:sp>
+      <p:sp>
+        <p:nvSpPr>
+          <p:cNvPr id="8" name="TextBox 7">
+            <a:extLst>
+              <a:ext uri="{FF2B5EF4-FFF2-40B4-BE49-F238E27FC236}">
+                <a16:creationId xmlns:a16="http://schemas.microsoft.com/office/drawing/2014/main" id="{C61B684E-FDA7-4625-9CC3-79C17CC59ED7}"/>
+              </a:ext>
+            </a:extLst>
+          </p:cNvPr>
+          <p:cNvSpPr txBox="1"/>
+          <p:nvPr/>
+        </p:nvSpPr>
+        <p:spPr>
+          <a:xfrm>
+            <a:off x="246888" y="2479578"/>
+            <a:ext cx="11576304" cy="1569660"/>
+          </a:xfrm>
+          <a:prstGeom prst="rect">
+            <a:avLst/>
+          </a:prstGeom>
+          <a:noFill/>
+        </p:spPr>
+        <p:txBody>
+          <a:bodyPr wrap="square" rtlCol="0">
+            <a:spAutoFit/>
+          </a:bodyPr>
+          <a:lstStyle/>
+          <a:p>
+            <a:pPr marL="0" marR="0" lvl="0" indent="0" algn="ctr" defTabSz="914400" rtl="0" eaLnBrk="1" fontAlgn="auto" latinLnBrk="0" hangingPunct="1">
+              <a:lnSpc>
+                <a:spcPct val="100000"/>
+              </a:lnSpc>
+              <a:spcBef>
+                <a:spcPts val="0"/>
+              </a:spcBef>
+              <a:spcAft>
+                <a:spcPts val="0"/>
+              </a:spcAft>
+              <a:buClrTx/>
+              <a:buSzTx/>
+              <a:buFontTx/>
+              <a:buNone/>
+              <a:tabLst/>
+              <a:defRPr/>
+            </a:pPr>
+            <a:r>
+              <a:rPr kumimoji="0" lang="en-GB" sz="3200" i="0" u="none" strike="noStrike" kern="1200" cap="none" spc="0" normalizeH="0" baseline="0" noProof="0" dirty="0">
+                <a:ln>
+                  <a:noFill/>
+                </a:ln>
+                <a:solidFill>
+                  <a:prstClr val="black"/>
+                </a:solidFill>
+                <a:effectLst/>
+                <a:uLnTx/>
+                <a:uFillTx/>
+                <a:latin typeface="Calibri" panose="020F0502020204030204"/>
+                <a:ea typeface="+mn-ea"/>
+                <a:cs typeface="+mn-cs"/>
+              </a:rPr>
+              <a:t>Section </a:t>
+            </a:r>
+            <a:r>
+              <a:rPr lang="en-GB" sz="3200" dirty="0">
+                <a:solidFill>
+                  <a:prstClr val="black"/>
+                </a:solidFill>
+                <a:latin typeface="Calibri" panose="020F0502020204030204"/>
+              </a:rPr>
+              <a:t>8</a:t>
+            </a:r>
+            <a:endParaRPr kumimoji="0" lang="en-GB" sz="3200" i="0" u="none" strike="noStrike" kern="1200" cap="none" spc="0" normalizeH="0" baseline="0" noProof="0" dirty="0">
+              <a:ln>
+                <a:noFill/>
+              </a:ln>
+              <a:solidFill>
+                <a:prstClr val="black"/>
+              </a:solidFill>
+              <a:effectLst/>
+              <a:uLnTx/>
+              <a:uFillTx/>
+              <a:latin typeface="Calibri" panose="020F0502020204030204"/>
+              <a:ea typeface="+mn-ea"/>
+              <a:cs typeface="+mn-cs"/>
+            </a:endParaRPr>
+          </a:p>
+          <a:p>
+            <a:pPr marL="0" marR="0" lvl="0" indent="0" algn="ctr" defTabSz="914400" rtl="0" eaLnBrk="1" fontAlgn="auto" latinLnBrk="0" hangingPunct="1">
+              <a:lnSpc>
+                <a:spcPct val="100000"/>
+              </a:lnSpc>
+              <a:spcBef>
+                <a:spcPts val="0"/>
+              </a:spcBef>
+              <a:spcAft>
+                <a:spcPts val="0"/>
+              </a:spcAft>
+              <a:buClrTx/>
+              <a:buSzTx/>
+              <a:buFontTx/>
+              <a:buNone/>
+              <a:tabLst/>
+              <a:defRPr/>
+            </a:pPr>
+            <a:endParaRPr kumimoji="0" lang="en-GB" sz="3200" b="1" i="0" u="none" strike="noStrike" kern="1200" cap="none" spc="0" normalizeH="0" baseline="0" noProof="0" dirty="0">
+              <a:ln>
+                <a:noFill/>
+              </a:ln>
+              <a:solidFill>
+                <a:prstClr val="black"/>
+              </a:solidFill>
+              <a:effectLst/>
+              <a:uLnTx/>
+              <a:uFillTx/>
+              <a:latin typeface="Calibri" panose="020F0502020204030204"/>
+              <a:ea typeface="+mn-ea"/>
+              <a:cs typeface="+mn-cs"/>
+            </a:endParaRPr>
+          </a:p>
+          <a:p>
+            <a:pPr marL="0" marR="0" lvl="0" indent="0" algn="ctr" defTabSz="914400" rtl="0" eaLnBrk="1" fontAlgn="auto" latinLnBrk="0" hangingPunct="1">
+              <a:lnSpc>
+                <a:spcPct val="100000"/>
+              </a:lnSpc>
+              <a:spcBef>
+                <a:spcPts val="0"/>
+              </a:spcBef>
+              <a:spcAft>
+                <a:spcPts val="0"/>
+              </a:spcAft>
+              <a:buClrTx/>
+              <a:buSzTx/>
+              <a:buFontTx/>
+              <a:buNone/>
+              <a:tabLst/>
+              <a:defRPr/>
+            </a:pPr>
+            <a:r>
+              <a:rPr kumimoji="0" lang="en-GB" sz="3200" b="1" i="0" u="none" strike="noStrike" kern="1200" cap="none" spc="0" normalizeH="0" baseline="0" noProof="0" dirty="0">
+                <a:ln>
+                  <a:noFill/>
+                </a:ln>
+                <a:solidFill>
+                  <a:prstClr val="black"/>
+                </a:solidFill>
+                <a:effectLst/>
+                <a:uLnTx/>
+                <a:uFillTx/>
+                <a:latin typeface="Calibri" panose="020F0502020204030204"/>
+                <a:ea typeface="+mn-ea"/>
+                <a:cs typeface="+mn-cs"/>
+              </a:rPr>
+              <a:t>Solving the Mystery</a:t>
+            </a:r>
+          </a:p>
+        </p:txBody>
+      </p:sp>
+    </p:spTree>
+    <p:extLst>
+      <p:ext uri="{BB962C8B-B14F-4D97-AF65-F5344CB8AC3E}">
+        <p14:creationId xmlns:p14="http://schemas.microsoft.com/office/powerpoint/2010/main" val="1279348573"/>
+      </p:ext>
+    </p:extLst>
+  </p:cSld>
+  <p:clrMapOvr>
+    <a:masterClrMapping/>
+  </p:clrMapOvr>
+</p:sld>
+</file>
+
+<file path=ppt/slides/slide14.xml><?xml version="1.0" encoding="utf-8"?>
+<p:sld xmlns:a="http://schemas.openxmlformats.org/drawingml/2006/main" xmlns:r="http://schemas.openxmlformats.org/officeDocument/2006/relationships" xmlns:p="http://schemas.openxmlformats.org/presentationml/2006/main">
+  <p:cSld>
+    <p:spTree>
+      <p:nvGrpSpPr>
+        <p:cNvPr id="1" name=""/>
+        <p:cNvGrpSpPr/>
+        <p:nvPr/>
+      </p:nvGrpSpPr>
+      <p:grpSpPr>
+        <a:xfrm>
+          <a:off x="0" y="0"/>
+          <a:ext cx="0" cy="0"/>
+          <a:chOff x="0" y="0"/>
+          <a:chExt cx="0" cy="0"/>
+        </a:xfrm>
+      </p:grpSpPr>
+      <p:pic>
+        <p:nvPicPr>
+          <p:cNvPr id="2" name="Picture 2" descr="What is SQL? - Tech Monitor">
+            <a:extLst>
+              <a:ext uri="{FF2B5EF4-FFF2-40B4-BE49-F238E27FC236}">
+                <a16:creationId xmlns:a16="http://schemas.microsoft.com/office/drawing/2014/main" id="{6B52F4A0-16E8-43E9-BF09-6D67DF948D7E}"/>
+              </a:ext>
+            </a:extLst>
+          </p:cNvPr>
+          <p:cNvPicPr>
+            <a:picLocks noChangeAspect="1" noChangeArrowheads="1"/>
+          </p:cNvPicPr>
+          <p:nvPr/>
+        </p:nvPicPr>
+        <p:blipFill rotWithShape="1">
+          <a:blip r:embed="rId2">
+            <a:extLst>
+              <a:ext uri="{28A0092B-C50C-407E-A947-70E740481C1C}">
+                <a14:useLocalDpi xmlns:a14="http://schemas.microsoft.com/office/drawing/2010/main" val="0"/>
+              </a:ext>
+            </a:extLst>
+          </a:blip>
+          <a:srcRect l="26148" r="27610"/>
+          <a:stretch/>
+        </p:blipFill>
+        <p:spPr bwMode="auto">
+          <a:xfrm>
+            <a:off x="136857" y="84112"/>
+            <a:ext cx="689376" cy="782667"/>
+          </a:xfrm>
+          <a:prstGeom prst="rect">
+            <a:avLst/>
+          </a:prstGeom>
+          <a:noFill/>
+          <a:extLst>
+            <a:ext uri="{909E8E84-426E-40DD-AFC4-6F175D3DCCD1}">
+              <a14:hiddenFill xmlns:a14="http://schemas.microsoft.com/office/drawing/2010/main">
+                <a:solidFill>
+                  <a:srgbClr val="FFFFFF"/>
+                </a:solidFill>
+              </a14:hiddenFill>
+            </a:ext>
+          </a:extLst>
+        </p:spPr>
+      </p:pic>
+      <p:cxnSp>
+        <p:nvCxnSpPr>
+          <p:cNvPr id="5" name="Straight Connector 4">
+            <a:extLst>
+              <a:ext uri="{FF2B5EF4-FFF2-40B4-BE49-F238E27FC236}">
+                <a16:creationId xmlns:a16="http://schemas.microsoft.com/office/drawing/2014/main" id="{A8BE4EF8-406C-4035-940C-AB752B29BA18}"/>
+              </a:ext>
+            </a:extLst>
+          </p:cNvPr>
+          <p:cNvCxnSpPr/>
+          <p:nvPr/>
+        </p:nvCxnSpPr>
+        <p:spPr>
+          <a:xfrm>
+            <a:off x="99755" y="955963"/>
+            <a:ext cx="11953701" cy="0"/>
+          </a:xfrm>
+          <a:prstGeom prst="line">
+            <a:avLst/>
+          </a:prstGeom>
+          <a:ln w="19050">
+            <a:solidFill>
+              <a:srgbClr val="0072C6"/>
+            </a:solidFill>
+          </a:ln>
+        </p:spPr>
+        <p:style>
+          <a:lnRef idx="1">
+            <a:schemeClr val="accent1"/>
+          </a:lnRef>
+          <a:fillRef idx="0">
+            <a:schemeClr val="accent1"/>
+          </a:fillRef>
+          <a:effectRef idx="0">
+            <a:schemeClr val="accent1"/>
+          </a:effectRef>
+          <a:fontRef idx="minor">
+            <a:schemeClr val="tx1"/>
+          </a:fontRef>
+        </p:style>
+      </p:cxnSp>
+      <p:sp>
+        <p:nvSpPr>
+          <p:cNvPr id="6" name="TextBox 5">
+            <a:extLst>
+              <a:ext uri="{FF2B5EF4-FFF2-40B4-BE49-F238E27FC236}">
+                <a16:creationId xmlns:a16="http://schemas.microsoft.com/office/drawing/2014/main" id="{4A5E75BC-B6AC-4138-AB81-9DEC0096C5A8}"/>
+              </a:ext>
+            </a:extLst>
+          </p:cNvPr>
+          <p:cNvSpPr txBox="1"/>
+          <p:nvPr/>
+        </p:nvSpPr>
+        <p:spPr>
+          <a:xfrm>
+            <a:off x="914402" y="191193"/>
+            <a:ext cx="3483032" cy="646331"/>
+          </a:xfrm>
+          <a:prstGeom prst="rect">
+            <a:avLst/>
+          </a:prstGeom>
+          <a:noFill/>
+        </p:spPr>
+        <p:txBody>
+          <a:bodyPr wrap="square" rtlCol="0">
+            <a:spAutoFit/>
+          </a:bodyPr>
+          <a:lstStyle/>
+          <a:p>
+            <a:pPr marL="0" marR="0" lvl="0" indent="0" algn="l" defTabSz="914400" rtl="0" eaLnBrk="1" fontAlgn="auto" latinLnBrk="0" hangingPunct="1">
+              <a:lnSpc>
+                <a:spcPct val="100000"/>
+              </a:lnSpc>
+              <a:spcBef>
+                <a:spcPts val="0"/>
+              </a:spcBef>
+              <a:spcAft>
+                <a:spcPts val="0"/>
+              </a:spcAft>
+              <a:buClrTx/>
+              <a:buSzTx/>
+              <a:buFontTx/>
+              <a:buNone/>
+              <a:tabLst/>
+              <a:defRPr/>
+            </a:pPr>
+            <a:r>
+              <a:rPr kumimoji="0" lang="en-GB" sz="1800" b="0" i="0" u="none" strike="noStrike" kern="1200" cap="none" spc="0" normalizeH="0" baseline="0" noProof="0" dirty="0">
+                <a:ln>
+                  <a:noFill/>
+                </a:ln>
+                <a:solidFill>
+                  <a:prstClr val="black"/>
+                </a:solidFill>
+                <a:effectLst/>
+                <a:uLnTx/>
+                <a:uFillTx/>
+                <a:latin typeface="Calibri" panose="020F0502020204030204"/>
+                <a:ea typeface="+mn-ea"/>
+                <a:cs typeface="+mn-cs"/>
+              </a:rPr>
+              <a:t>Complete SQL and Database Bootcamp: Zero to Mastery</a:t>
+            </a:r>
+          </a:p>
+        </p:txBody>
+      </p:sp>
+      <p:sp>
+        <p:nvSpPr>
+          <p:cNvPr id="8" name="TextBox 7">
+            <a:extLst>
+              <a:ext uri="{FF2B5EF4-FFF2-40B4-BE49-F238E27FC236}">
+                <a16:creationId xmlns:a16="http://schemas.microsoft.com/office/drawing/2014/main" id="{C61B684E-FDA7-4625-9CC3-79C17CC59ED7}"/>
+              </a:ext>
+            </a:extLst>
+          </p:cNvPr>
+          <p:cNvSpPr txBox="1"/>
+          <p:nvPr/>
+        </p:nvSpPr>
+        <p:spPr>
+          <a:xfrm>
+            <a:off x="246888" y="2479578"/>
+            <a:ext cx="11576304" cy="1569660"/>
+          </a:xfrm>
+          <a:prstGeom prst="rect">
+            <a:avLst/>
+          </a:prstGeom>
+          <a:noFill/>
+        </p:spPr>
+        <p:txBody>
+          <a:bodyPr wrap="square" rtlCol="0">
+            <a:spAutoFit/>
+          </a:bodyPr>
+          <a:lstStyle/>
+          <a:p>
+            <a:pPr marL="0" marR="0" lvl="0" indent="0" algn="ctr" defTabSz="914400" rtl="0" eaLnBrk="1" fontAlgn="auto" latinLnBrk="0" hangingPunct="1">
+              <a:lnSpc>
+                <a:spcPct val="100000"/>
+              </a:lnSpc>
+              <a:spcBef>
+                <a:spcPts val="0"/>
+              </a:spcBef>
+              <a:spcAft>
+                <a:spcPts val="0"/>
+              </a:spcAft>
+              <a:buClrTx/>
+              <a:buSzTx/>
+              <a:buFontTx/>
+              <a:buNone/>
+              <a:tabLst/>
+              <a:defRPr/>
+            </a:pPr>
+            <a:r>
+              <a:rPr kumimoji="0" lang="en-GB" sz="3200" i="0" u="none" strike="noStrike" kern="1200" cap="none" spc="0" normalizeH="0" baseline="0" noProof="0" dirty="0">
+                <a:ln>
+                  <a:noFill/>
+                </a:ln>
+                <a:solidFill>
+                  <a:prstClr val="black"/>
+                </a:solidFill>
+                <a:effectLst/>
+                <a:uLnTx/>
+                <a:uFillTx/>
+                <a:latin typeface="Calibri" panose="020F0502020204030204"/>
+                <a:ea typeface="+mn-ea"/>
+                <a:cs typeface="+mn-cs"/>
+              </a:rPr>
+              <a:t>Section </a:t>
+            </a:r>
+            <a:r>
+              <a:rPr lang="en-GB" sz="3200" dirty="0">
+                <a:solidFill>
+                  <a:prstClr val="black"/>
+                </a:solidFill>
+                <a:latin typeface="Calibri" panose="020F0502020204030204"/>
+              </a:rPr>
+              <a:t>9</a:t>
+            </a:r>
+            <a:endParaRPr kumimoji="0" lang="en-GB" sz="3200" i="0" u="none" strike="noStrike" kern="1200" cap="none" spc="0" normalizeH="0" baseline="0" noProof="0" dirty="0">
+              <a:ln>
+                <a:noFill/>
+              </a:ln>
+              <a:solidFill>
+                <a:prstClr val="black"/>
+              </a:solidFill>
+              <a:effectLst/>
+              <a:uLnTx/>
+              <a:uFillTx/>
+              <a:latin typeface="Calibri" panose="020F0502020204030204"/>
+              <a:ea typeface="+mn-ea"/>
+              <a:cs typeface="+mn-cs"/>
+            </a:endParaRPr>
+          </a:p>
+          <a:p>
+            <a:pPr marL="0" marR="0" lvl="0" indent="0" algn="ctr" defTabSz="914400" rtl="0" eaLnBrk="1" fontAlgn="auto" latinLnBrk="0" hangingPunct="1">
+              <a:lnSpc>
+                <a:spcPct val="100000"/>
+              </a:lnSpc>
+              <a:spcBef>
+                <a:spcPts val="0"/>
+              </a:spcBef>
+              <a:spcAft>
+                <a:spcPts val="0"/>
+              </a:spcAft>
+              <a:buClrTx/>
+              <a:buSzTx/>
+              <a:buFontTx/>
+              <a:buNone/>
+              <a:tabLst/>
+              <a:defRPr/>
+            </a:pPr>
+            <a:endParaRPr kumimoji="0" lang="en-GB" sz="3200" b="1" i="0" u="none" strike="noStrike" kern="1200" cap="none" spc="0" normalizeH="0" baseline="0" noProof="0" dirty="0">
+              <a:ln>
+                <a:noFill/>
+              </a:ln>
+              <a:solidFill>
+                <a:prstClr val="black"/>
+              </a:solidFill>
+              <a:effectLst/>
+              <a:uLnTx/>
+              <a:uFillTx/>
+              <a:latin typeface="Calibri" panose="020F0502020204030204"/>
+              <a:ea typeface="+mn-ea"/>
+              <a:cs typeface="+mn-cs"/>
+            </a:endParaRPr>
+          </a:p>
+          <a:p>
+            <a:pPr marL="0" marR="0" lvl="0" indent="0" algn="ctr" defTabSz="914400" rtl="0" eaLnBrk="1" fontAlgn="auto" latinLnBrk="0" hangingPunct="1">
+              <a:lnSpc>
+                <a:spcPct val="100000"/>
+              </a:lnSpc>
+              <a:spcBef>
+                <a:spcPts val="0"/>
+              </a:spcBef>
+              <a:spcAft>
+                <a:spcPts val="0"/>
+              </a:spcAft>
+              <a:buClrTx/>
+              <a:buSzTx/>
+              <a:buFontTx/>
+              <a:buNone/>
+              <a:tabLst/>
+              <a:defRPr/>
+            </a:pPr>
+            <a:r>
+              <a:rPr kumimoji="0" lang="en-GB" sz="3200" b="1" i="0" u="none" strike="noStrike" kern="1200" cap="none" spc="0" normalizeH="0" baseline="0" noProof="0" dirty="0">
+                <a:ln>
+                  <a:noFill/>
+                </a:ln>
+                <a:solidFill>
+                  <a:prstClr val="black"/>
+                </a:solidFill>
+                <a:effectLst/>
+                <a:uLnTx/>
+                <a:uFillTx/>
+                <a:latin typeface="Calibri" panose="020F0502020204030204"/>
+                <a:ea typeface="+mn-ea"/>
+                <a:cs typeface="+mn-cs"/>
+              </a:rPr>
               <a:t>Database Design</a:t>
             </a:r>
           </a:p>
@@ -4332,7 +5280,7 @@
 </p:sld>
 </file>
 
-<file path=ppt/slides/slide12.xml><?xml version="1.0" encoding="utf-8"?>
+<file path=ppt/slides/slide15.xml><?xml version="1.0" encoding="utf-8"?>
 <p:sld xmlns:a="http://schemas.openxmlformats.org/drawingml/2006/main" xmlns:r="http://schemas.openxmlformats.org/officeDocument/2006/relationships" xmlns:p="http://schemas.openxmlformats.org/presentationml/2006/main">
   <p:cSld>
     <p:spTree>
@@ -7812,6 +8760,2377 @@
           </a:extLst>
         </p:spPr>
       </p:pic>
+      <p:grpSp>
+        <p:nvGrpSpPr>
+          <p:cNvPr id="18" name="Group 17">
+            <a:extLst>
+              <a:ext uri="{FF2B5EF4-FFF2-40B4-BE49-F238E27FC236}">
+                <a16:creationId xmlns:a16="http://schemas.microsoft.com/office/drawing/2014/main" id="{6185BE9B-87C8-4B46-9293-0E71CF17E76A}"/>
+              </a:ext>
+            </a:extLst>
+          </p:cNvPr>
+          <p:cNvGrpSpPr/>
+          <p:nvPr/>
+        </p:nvGrpSpPr>
+        <p:grpSpPr>
+          <a:xfrm>
+            <a:off x="99755" y="83129"/>
+            <a:ext cx="11953701" cy="872834"/>
+            <a:chOff x="99755" y="83129"/>
+            <a:chExt cx="11953701" cy="872834"/>
+          </a:xfrm>
+        </p:grpSpPr>
+        <p:cxnSp>
+          <p:nvCxnSpPr>
+            <p:cNvPr id="5" name="Straight Connector 4">
+              <a:extLst>
+                <a:ext uri="{FF2B5EF4-FFF2-40B4-BE49-F238E27FC236}">
+                  <a16:creationId xmlns:a16="http://schemas.microsoft.com/office/drawing/2014/main" id="{A8BE4EF8-406C-4035-940C-AB752B29BA18}"/>
+                </a:ext>
+              </a:extLst>
+            </p:cNvPr>
+            <p:cNvCxnSpPr/>
+            <p:nvPr/>
+          </p:nvCxnSpPr>
+          <p:spPr>
+            <a:xfrm>
+              <a:off x="99755" y="955963"/>
+              <a:ext cx="11953701" cy="0"/>
+            </a:xfrm>
+            <a:prstGeom prst="line">
+              <a:avLst/>
+            </a:prstGeom>
+            <a:ln w="19050">
+              <a:solidFill>
+                <a:srgbClr val="0072C6"/>
+              </a:solidFill>
+            </a:ln>
+          </p:spPr>
+          <p:style>
+            <a:lnRef idx="1">
+              <a:schemeClr val="accent1"/>
+            </a:lnRef>
+            <a:fillRef idx="0">
+              <a:schemeClr val="accent1"/>
+            </a:fillRef>
+            <a:effectRef idx="0">
+              <a:schemeClr val="accent1"/>
+            </a:effectRef>
+            <a:fontRef idx="minor">
+              <a:schemeClr val="tx1"/>
+            </a:fontRef>
+          </p:style>
+        </p:cxnSp>
+        <p:sp>
+          <p:nvSpPr>
+            <p:cNvPr id="6" name="TextBox 5">
+              <a:extLst>
+                <a:ext uri="{FF2B5EF4-FFF2-40B4-BE49-F238E27FC236}">
+                  <a16:creationId xmlns:a16="http://schemas.microsoft.com/office/drawing/2014/main" id="{4A5E75BC-B6AC-4138-AB81-9DEC0096C5A8}"/>
+                </a:ext>
+              </a:extLst>
+            </p:cNvPr>
+            <p:cNvSpPr txBox="1"/>
+            <p:nvPr/>
+          </p:nvSpPr>
+          <p:spPr>
+            <a:xfrm>
+              <a:off x="914402" y="191193"/>
+              <a:ext cx="3483032" cy="646331"/>
+            </a:xfrm>
+            <a:prstGeom prst="rect">
+              <a:avLst/>
+            </a:prstGeom>
+            <a:noFill/>
+          </p:spPr>
+          <p:txBody>
+            <a:bodyPr wrap="square" rtlCol="0">
+              <a:spAutoFit/>
+            </a:bodyPr>
+            <a:lstStyle/>
+            <a:p>
+              <a:pPr marL="0" marR="0" lvl="0" indent="0" algn="l" defTabSz="914400" rtl="0" eaLnBrk="1" fontAlgn="auto" latinLnBrk="0" hangingPunct="1">
+                <a:lnSpc>
+                  <a:spcPct val="100000"/>
+                </a:lnSpc>
+                <a:spcBef>
+                  <a:spcPts val="0"/>
+                </a:spcBef>
+                <a:spcAft>
+                  <a:spcPts val="0"/>
+                </a:spcAft>
+                <a:buClrTx/>
+                <a:buSzTx/>
+                <a:buFontTx/>
+                <a:buNone/>
+                <a:tabLst/>
+                <a:defRPr/>
+              </a:pPr>
+              <a:r>
+                <a:rPr kumimoji="0" lang="en-GB" sz="1800" b="0" i="0" u="none" strike="noStrike" kern="1200" cap="none" spc="0" normalizeH="0" baseline="0" noProof="0" dirty="0">
+                  <a:ln>
+                    <a:noFill/>
+                  </a:ln>
+                  <a:solidFill>
+                    <a:prstClr val="black"/>
+                  </a:solidFill>
+                  <a:effectLst/>
+                  <a:uLnTx/>
+                  <a:uFillTx/>
+                  <a:latin typeface="Calibri" panose="020F0502020204030204"/>
+                  <a:ea typeface="+mn-ea"/>
+                  <a:cs typeface="+mn-cs"/>
+                </a:rPr>
+                <a:t>Complete SQL and Database Bootcamp: Zero to Mastery</a:t>
+              </a:r>
+            </a:p>
+          </p:txBody>
+        </p:sp>
+        <p:sp>
+          <p:nvSpPr>
+            <p:cNvPr id="8" name="TextBox 7">
+              <a:extLst>
+                <a:ext uri="{FF2B5EF4-FFF2-40B4-BE49-F238E27FC236}">
+                  <a16:creationId xmlns:a16="http://schemas.microsoft.com/office/drawing/2014/main" id="{C61B684E-FDA7-4625-9CC3-79C17CC59ED7}"/>
+                </a:ext>
+              </a:extLst>
+            </p:cNvPr>
+            <p:cNvSpPr txBox="1"/>
+            <p:nvPr/>
+          </p:nvSpPr>
+          <p:spPr>
+            <a:xfrm>
+              <a:off x="4372494" y="180818"/>
+              <a:ext cx="2686392" cy="369332"/>
+            </a:xfrm>
+            <a:prstGeom prst="rect">
+              <a:avLst/>
+            </a:prstGeom>
+            <a:noFill/>
+          </p:spPr>
+          <p:txBody>
+            <a:bodyPr wrap="square" rtlCol="0">
+              <a:spAutoFit/>
+            </a:bodyPr>
+            <a:lstStyle/>
+            <a:p>
+              <a:pPr marL="0" marR="0" lvl="0" indent="0" algn="l" defTabSz="914400" rtl="0" eaLnBrk="1" fontAlgn="auto" latinLnBrk="0" hangingPunct="1">
+                <a:lnSpc>
+                  <a:spcPct val="100000"/>
+                </a:lnSpc>
+                <a:spcBef>
+                  <a:spcPts val="0"/>
+                </a:spcBef>
+                <a:spcAft>
+                  <a:spcPts val="0"/>
+                </a:spcAft>
+                <a:buClrTx/>
+                <a:buSzTx/>
+                <a:buFontTx/>
+                <a:buNone/>
+                <a:tabLst/>
+                <a:defRPr/>
+              </a:pPr>
+              <a:r>
+                <a:rPr kumimoji="0" lang="en-GB" sz="1800" b="0" i="0" u="none" strike="noStrike" kern="1200" cap="none" spc="0" normalizeH="0" baseline="0" noProof="0" dirty="0">
+                  <a:ln>
+                    <a:noFill/>
+                  </a:ln>
+                  <a:solidFill>
+                    <a:prstClr val="black"/>
+                  </a:solidFill>
+                  <a:effectLst/>
+                  <a:uLnTx/>
+                  <a:uFillTx/>
+                  <a:latin typeface="Calibri" panose="020F0502020204030204"/>
+                  <a:ea typeface="+mn-ea"/>
+                  <a:cs typeface="+mn-cs"/>
+                </a:rPr>
+                <a:t>History &amp; Story of Data</a:t>
+              </a:r>
+            </a:p>
+          </p:txBody>
+        </p:sp>
+        <p:sp>
+          <p:nvSpPr>
+            <p:cNvPr id="9" name="TextBox 8">
+              <a:extLst>
+                <a:ext uri="{FF2B5EF4-FFF2-40B4-BE49-F238E27FC236}">
+                  <a16:creationId xmlns:a16="http://schemas.microsoft.com/office/drawing/2014/main" id="{F6943DFB-F258-4603-B2D8-7E2958123510}"/>
+                </a:ext>
+              </a:extLst>
+            </p:cNvPr>
+            <p:cNvSpPr txBox="1"/>
+            <p:nvPr/>
+          </p:nvSpPr>
+          <p:spPr>
+            <a:xfrm>
+              <a:off x="7197436" y="190641"/>
+              <a:ext cx="2155764" cy="369332"/>
+            </a:xfrm>
+            <a:prstGeom prst="rect">
+              <a:avLst/>
+            </a:prstGeom>
+            <a:noFill/>
+          </p:spPr>
+          <p:txBody>
+            <a:bodyPr wrap="square" rtlCol="0">
+              <a:spAutoFit/>
+            </a:bodyPr>
+            <a:lstStyle/>
+            <a:p>
+              <a:pPr marL="0" marR="0" lvl="0" indent="0" algn="l" defTabSz="914400" rtl="0" eaLnBrk="1" fontAlgn="auto" latinLnBrk="0" hangingPunct="1">
+                <a:lnSpc>
+                  <a:spcPct val="100000"/>
+                </a:lnSpc>
+                <a:spcBef>
+                  <a:spcPts val="0"/>
+                </a:spcBef>
+                <a:spcAft>
+                  <a:spcPts val="0"/>
+                </a:spcAft>
+                <a:buClrTx/>
+                <a:buSzTx/>
+                <a:buFontTx/>
+                <a:buNone/>
+                <a:tabLst/>
+                <a:defRPr/>
+              </a:pPr>
+              <a:r>
+                <a:rPr kumimoji="0" lang="en-GB" sz="1800" b="0" i="0" u="none" strike="noStrike" kern="1200" cap="none" spc="0" normalizeH="0" baseline="0" noProof="0" dirty="0">
+                  <a:ln>
+                    <a:noFill/>
+                  </a:ln>
+                  <a:solidFill>
+                    <a:prstClr val="black"/>
+                  </a:solidFill>
+                  <a:effectLst/>
+                  <a:uLnTx/>
+                  <a:uFillTx/>
+                  <a:latin typeface="Calibri" panose="020F0502020204030204"/>
+                  <a:ea typeface="+mn-ea"/>
+                  <a:cs typeface="+mn-cs"/>
+                </a:rPr>
+                <a:t>Section: 2.16, 2.17</a:t>
+              </a:r>
+            </a:p>
+          </p:txBody>
+        </p:sp>
+        <p:sp>
+          <p:nvSpPr>
+            <p:cNvPr id="10" name="TextBox 9">
+              <a:extLst>
+                <a:ext uri="{FF2B5EF4-FFF2-40B4-BE49-F238E27FC236}">
+                  <a16:creationId xmlns:a16="http://schemas.microsoft.com/office/drawing/2014/main" id="{4E568F0D-7E90-4A0C-8070-6C806D992954}"/>
+                </a:ext>
+              </a:extLst>
+            </p:cNvPr>
+            <p:cNvSpPr txBox="1"/>
+            <p:nvPr/>
+          </p:nvSpPr>
+          <p:spPr>
+            <a:xfrm>
+              <a:off x="9534699" y="180818"/>
+              <a:ext cx="2155764" cy="369332"/>
+            </a:xfrm>
+            <a:prstGeom prst="rect">
+              <a:avLst/>
+            </a:prstGeom>
+            <a:noFill/>
+          </p:spPr>
+          <p:txBody>
+            <a:bodyPr wrap="square" rtlCol="0">
+              <a:spAutoFit/>
+            </a:bodyPr>
+            <a:lstStyle/>
+            <a:p>
+              <a:pPr marL="0" marR="0" lvl="0" indent="0" algn="l" defTabSz="914400" rtl="0" eaLnBrk="1" fontAlgn="auto" latinLnBrk="0" hangingPunct="1">
+                <a:lnSpc>
+                  <a:spcPct val="100000"/>
+                </a:lnSpc>
+                <a:spcBef>
+                  <a:spcPts val="0"/>
+                </a:spcBef>
+                <a:spcAft>
+                  <a:spcPts val="0"/>
+                </a:spcAft>
+                <a:buClrTx/>
+                <a:buSzTx/>
+                <a:buFontTx/>
+                <a:buNone/>
+                <a:tabLst/>
+                <a:defRPr/>
+              </a:pPr>
+              <a:r>
+                <a:rPr kumimoji="0" lang="en-GB" sz="1800" b="0" i="0" u="none" strike="noStrike" kern="1200" cap="none" spc="0" normalizeH="0" baseline="0" noProof="0" dirty="0">
+                  <a:ln>
+                    <a:noFill/>
+                  </a:ln>
+                  <a:solidFill>
+                    <a:prstClr val="black"/>
+                  </a:solidFill>
+                  <a:effectLst/>
+                  <a:uLnTx/>
+                  <a:uFillTx/>
+                  <a:latin typeface="Calibri" panose="020F0502020204030204"/>
+                  <a:ea typeface="+mn-ea"/>
+                  <a:cs typeface="+mn-cs"/>
+                </a:rPr>
+                <a:t>Date: 11/01/22 </a:t>
+              </a:r>
+            </a:p>
+          </p:txBody>
+        </p:sp>
+        <p:cxnSp>
+          <p:nvCxnSpPr>
+            <p:cNvPr id="11" name="Straight Connector 10">
+              <a:extLst>
+                <a:ext uri="{FF2B5EF4-FFF2-40B4-BE49-F238E27FC236}">
+                  <a16:creationId xmlns:a16="http://schemas.microsoft.com/office/drawing/2014/main" id="{F70ABCF3-BE60-426F-8C8C-059C854869C6}"/>
+                </a:ext>
+              </a:extLst>
+            </p:cNvPr>
+            <p:cNvCxnSpPr>
+              <a:cxnSpLocks/>
+            </p:cNvCxnSpPr>
+            <p:nvPr/>
+          </p:nvCxnSpPr>
+          <p:spPr>
+            <a:xfrm flipV="1">
+              <a:off x="4267202" y="93505"/>
+              <a:ext cx="1" cy="754394"/>
+            </a:xfrm>
+            <a:prstGeom prst="line">
+              <a:avLst/>
+            </a:prstGeom>
+            <a:ln w="19050">
+              <a:solidFill>
+                <a:srgbClr val="0072C6"/>
+              </a:solidFill>
+            </a:ln>
+          </p:spPr>
+          <p:style>
+            <a:lnRef idx="1">
+              <a:schemeClr val="accent1"/>
+            </a:lnRef>
+            <a:fillRef idx="0">
+              <a:schemeClr val="accent1"/>
+            </a:fillRef>
+            <a:effectRef idx="0">
+              <a:schemeClr val="accent1"/>
+            </a:effectRef>
+            <a:fontRef idx="minor">
+              <a:schemeClr val="tx1"/>
+            </a:fontRef>
+          </p:style>
+        </p:cxnSp>
+        <p:cxnSp>
+          <p:nvCxnSpPr>
+            <p:cNvPr id="15" name="Straight Connector 14">
+              <a:extLst>
+                <a:ext uri="{FF2B5EF4-FFF2-40B4-BE49-F238E27FC236}">
+                  <a16:creationId xmlns:a16="http://schemas.microsoft.com/office/drawing/2014/main" id="{D7F750D7-69E5-4FC3-AFB5-134C7587DE8B}"/>
+                </a:ext>
+              </a:extLst>
+            </p:cNvPr>
+            <p:cNvCxnSpPr>
+              <a:cxnSpLocks/>
+            </p:cNvCxnSpPr>
+            <p:nvPr/>
+          </p:nvCxnSpPr>
+          <p:spPr>
+            <a:xfrm flipV="1">
+              <a:off x="7154489" y="88317"/>
+              <a:ext cx="1" cy="754394"/>
+            </a:xfrm>
+            <a:prstGeom prst="line">
+              <a:avLst/>
+            </a:prstGeom>
+            <a:ln w="19050">
+              <a:solidFill>
+                <a:srgbClr val="0072C6"/>
+              </a:solidFill>
+            </a:ln>
+          </p:spPr>
+          <p:style>
+            <a:lnRef idx="1">
+              <a:schemeClr val="accent1"/>
+            </a:lnRef>
+            <a:fillRef idx="0">
+              <a:schemeClr val="accent1"/>
+            </a:fillRef>
+            <a:effectRef idx="0">
+              <a:schemeClr val="accent1"/>
+            </a:effectRef>
+            <a:fontRef idx="minor">
+              <a:schemeClr val="tx1"/>
+            </a:fontRef>
+          </p:style>
+        </p:cxnSp>
+        <p:cxnSp>
+          <p:nvCxnSpPr>
+            <p:cNvPr id="16" name="Straight Connector 15">
+              <a:extLst>
+                <a:ext uri="{FF2B5EF4-FFF2-40B4-BE49-F238E27FC236}">
+                  <a16:creationId xmlns:a16="http://schemas.microsoft.com/office/drawing/2014/main" id="{90F03633-4CAB-4B57-BF94-CF91E87AB7AE}"/>
+                </a:ext>
+              </a:extLst>
+            </p:cNvPr>
+            <p:cNvCxnSpPr>
+              <a:cxnSpLocks/>
+            </p:cNvCxnSpPr>
+            <p:nvPr/>
+          </p:nvCxnSpPr>
+          <p:spPr>
+            <a:xfrm flipV="1">
+              <a:off x="9491750" y="83129"/>
+              <a:ext cx="1" cy="754394"/>
+            </a:xfrm>
+            <a:prstGeom prst="line">
+              <a:avLst/>
+            </a:prstGeom>
+            <a:ln w="19050">
+              <a:solidFill>
+                <a:srgbClr val="0072C6"/>
+              </a:solidFill>
+            </a:ln>
+          </p:spPr>
+          <p:style>
+            <a:lnRef idx="1">
+              <a:schemeClr val="accent1"/>
+            </a:lnRef>
+            <a:fillRef idx="0">
+              <a:schemeClr val="accent1"/>
+            </a:fillRef>
+            <a:effectRef idx="0">
+              <a:schemeClr val="accent1"/>
+            </a:effectRef>
+            <a:fontRef idx="minor">
+              <a:schemeClr val="tx1"/>
+            </a:fontRef>
+          </p:style>
+        </p:cxnSp>
+      </p:grpSp>
+      <p:pic>
+        <p:nvPicPr>
+          <p:cNvPr id="20" name="Picture 19">
+            <a:extLst>
+              <a:ext uri="{FF2B5EF4-FFF2-40B4-BE49-F238E27FC236}">
+                <a16:creationId xmlns:a16="http://schemas.microsoft.com/office/drawing/2014/main" id="{48C8ACE1-368B-4F1E-839E-0E5F0139C7F8}"/>
+              </a:ext>
+            </a:extLst>
+          </p:cNvPr>
+          <p:cNvPicPr>
+            <a:picLocks noChangeAspect="1"/>
+          </p:cNvPicPr>
+          <p:nvPr/>
+        </p:nvPicPr>
+        <p:blipFill>
+          <a:blip r:embed="rId3"/>
+          <a:stretch>
+            <a:fillRect/>
+          </a:stretch>
+        </p:blipFill>
+        <p:spPr>
+          <a:xfrm>
+            <a:off x="6096000" y="1280783"/>
+            <a:ext cx="5498828" cy="5396399"/>
+          </a:xfrm>
+          <a:prstGeom prst="rect">
+            <a:avLst/>
+          </a:prstGeom>
+        </p:spPr>
+      </p:pic>
+      <p:pic>
+        <p:nvPicPr>
+          <p:cNvPr id="22" name="Picture 21">
+            <a:extLst>
+              <a:ext uri="{FF2B5EF4-FFF2-40B4-BE49-F238E27FC236}">
+                <a16:creationId xmlns:a16="http://schemas.microsoft.com/office/drawing/2014/main" id="{6944B7F2-BC4D-4C8B-B07D-28C0E11CE289}"/>
+              </a:ext>
+            </a:extLst>
+          </p:cNvPr>
+          <p:cNvPicPr>
+            <a:picLocks noChangeAspect="1"/>
+          </p:cNvPicPr>
+          <p:nvPr/>
+        </p:nvPicPr>
+        <p:blipFill>
+          <a:blip r:embed="rId4"/>
+          <a:stretch>
+            <a:fillRect/>
+          </a:stretch>
+        </p:blipFill>
+        <p:spPr>
+          <a:xfrm>
+            <a:off x="243411" y="4178463"/>
+            <a:ext cx="5559968" cy="2488344"/>
+          </a:xfrm>
+          <a:prstGeom prst="rect">
+            <a:avLst/>
+          </a:prstGeom>
+        </p:spPr>
+      </p:pic>
+      <p:sp>
+        <p:nvSpPr>
+          <p:cNvPr id="23" name="Rectangle 22">
+            <a:extLst>
+              <a:ext uri="{FF2B5EF4-FFF2-40B4-BE49-F238E27FC236}">
+                <a16:creationId xmlns:a16="http://schemas.microsoft.com/office/drawing/2014/main" id="{F7AC61A0-DF14-4908-817C-80F50CBAE213}"/>
+              </a:ext>
+            </a:extLst>
+          </p:cNvPr>
+          <p:cNvSpPr/>
+          <p:nvPr/>
+        </p:nvSpPr>
+        <p:spPr>
+          <a:xfrm>
+            <a:off x="243411" y="1105649"/>
+            <a:ext cx="5386607" cy="2140136"/>
+          </a:xfrm>
+          <a:prstGeom prst="rect">
+            <a:avLst/>
+          </a:prstGeom>
+          <a:noFill/>
+          <a:ln>
+            <a:noFill/>
+          </a:ln>
+        </p:spPr>
+        <p:style>
+          <a:lnRef idx="2">
+            <a:schemeClr val="accent1">
+              <a:shade val="50000"/>
+            </a:schemeClr>
+          </a:lnRef>
+          <a:fillRef idx="1">
+            <a:schemeClr val="accent1"/>
+          </a:fillRef>
+          <a:effectRef idx="0">
+            <a:schemeClr val="accent1"/>
+          </a:effectRef>
+          <a:fontRef idx="minor">
+            <a:schemeClr val="lt1"/>
+          </a:fontRef>
+        </p:style>
+        <p:txBody>
+          <a:bodyPr rtlCol="0" anchor="t"/>
+          <a:lstStyle/>
+          <a:p>
+            <a:pPr marL="0" marR="0" lvl="0" indent="0" algn="l" defTabSz="914400" rtl="0" eaLnBrk="1" fontAlgn="auto" latinLnBrk="0" hangingPunct="1">
+              <a:lnSpc>
+                <a:spcPct val="120000"/>
+              </a:lnSpc>
+              <a:spcBef>
+                <a:spcPts val="0"/>
+              </a:spcBef>
+              <a:spcAft>
+                <a:spcPts val="0"/>
+              </a:spcAft>
+              <a:buClrTx/>
+              <a:buSzTx/>
+              <a:buFontTx/>
+              <a:buNone/>
+              <a:tabLst/>
+              <a:defRPr/>
+            </a:pPr>
+            <a:r>
+              <a:rPr kumimoji="0" lang="en-GB" sz="1600" i="0" u="none" strike="noStrike" kern="1200" cap="none" spc="0" normalizeH="0" baseline="0" noProof="0" dirty="0">
+                <a:ln>
+                  <a:noFill/>
+                </a:ln>
+                <a:solidFill>
+                  <a:prstClr val="black"/>
+                </a:solidFill>
+                <a:effectLst/>
+                <a:uLnTx/>
+                <a:uFillTx/>
+                <a:latin typeface="Calibri" panose="020F0502020204030204"/>
+                <a:ea typeface="+mn-ea"/>
+                <a:cs typeface="+mn-cs"/>
+              </a:rPr>
+              <a:t>Example to the right shows the formation of a database with a table called ‘User’, along with a few basic SQL queries that return all the data as well as some more reduced queries just looking for specific data dependant on role (employee vs manager).</a:t>
+            </a:r>
+          </a:p>
+          <a:p>
+            <a:pPr marL="0" marR="0" lvl="0" indent="0" algn="l" defTabSz="914400" rtl="0" eaLnBrk="1" fontAlgn="auto" latinLnBrk="0" hangingPunct="1">
+              <a:lnSpc>
+                <a:spcPct val="120000"/>
+              </a:lnSpc>
+              <a:spcBef>
+                <a:spcPts val="0"/>
+              </a:spcBef>
+              <a:spcAft>
+                <a:spcPts val="0"/>
+              </a:spcAft>
+              <a:buClrTx/>
+              <a:buSzTx/>
+              <a:buFontTx/>
+              <a:buNone/>
+              <a:tabLst/>
+              <a:defRPr/>
+            </a:pPr>
+            <a:endParaRPr lang="en-GB" sz="1600" dirty="0">
+              <a:solidFill>
+                <a:prstClr val="black"/>
+              </a:solidFill>
+              <a:latin typeface="Calibri" panose="020F0502020204030204"/>
+            </a:endParaRPr>
+          </a:p>
+          <a:p>
+            <a:pPr marL="0" marR="0" lvl="0" indent="0" algn="l" defTabSz="914400" rtl="0" eaLnBrk="1" fontAlgn="auto" latinLnBrk="0" hangingPunct="1">
+              <a:lnSpc>
+                <a:spcPct val="120000"/>
+              </a:lnSpc>
+              <a:spcBef>
+                <a:spcPts val="0"/>
+              </a:spcBef>
+              <a:spcAft>
+                <a:spcPts val="0"/>
+              </a:spcAft>
+              <a:buClrTx/>
+              <a:buSzTx/>
+              <a:buFontTx/>
+              <a:buNone/>
+              <a:tabLst/>
+              <a:defRPr/>
+            </a:pPr>
+            <a:r>
+              <a:rPr kumimoji="0" lang="en-GB" sz="1600" i="0" u="none" strike="noStrike" kern="1200" cap="none" spc="0" normalizeH="0" baseline="0" noProof="0" dirty="0">
+                <a:ln>
+                  <a:noFill/>
+                </a:ln>
+                <a:solidFill>
+                  <a:prstClr val="black"/>
+                </a:solidFill>
+                <a:effectLst/>
+                <a:uLnTx/>
+                <a:uFillTx/>
+                <a:latin typeface="Calibri" panose="020F0502020204030204"/>
+                <a:ea typeface="+mn-ea"/>
+                <a:cs typeface="+mn-cs"/>
+              </a:rPr>
+              <a:t>Note that often all keywords are placed in capitals in SQL. </a:t>
+            </a:r>
+          </a:p>
+        </p:txBody>
+      </p:sp>
+      <p:sp>
+        <p:nvSpPr>
+          <p:cNvPr id="25" name="TextBox 24">
+            <a:extLst>
+              <a:ext uri="{FF2B5EF4-FFF2-40B4-BE49-F238E27FC236}">
+                <a16:creationId xmlns:a16="http://schemas.microsoft.com/office/drawing/2014/main" id="{17D30E7B-2000-49C5-A8EF-1430C250F8A2}"/>
+              </a:ext>
+            </a:extLst>
+          </p:cNvPr>
+          <p:cNvSpPr txBox="1"/>
+          <p:nvPr/>
+        </p:nvSpPr>
+        <p:spPr>
+          <a:xfrm>
+            <a:off x="99755" y="3612634"/>
+            <a:ext cx="5386607" cy="261610"/>
+          </a:xfrm>
+          <a:prstGeom prst="rect">
+            <a:avLst/>
+          </a:prstGeom>
+          <a:noFill/>
+        </p:spPr>
+        <p:txBody>
+          <a:bodyPr wrap="square">
+            <a:spAutoFit/>
+          </a:bodyPr>
+          <a:lstStyle/>
+          <a:p>
+            <a:r>
+              <a:rPr lang="en-GB" sz="1100" i="1" dirty="0">
+                <a:hlinkClick r:id="rId5"/>
+              </a:rPr>
+              <a:t>https://www.db-fiddle.com/f/ogAiTgZPjwvDxwVHiVK3Ek/530</a:t>
+            </a:r>
+            <a:endParaRPr lang="en-GB" sz="1100" i="1" dirty="0"/>
+          </a:p>
+        </p:txBody>
+      </p:sp>
+      <p:sp>
+        <p:nvSpPr>
+          <p:cNvPr id="27" name="TextBox 26">
+            <a:extLst>
+              <a:ext uri="{FF2B5EF4-FFF2-40B4-BE49-F238E27FC236}">
+                <a16:creationId xmlns:a16="http://schemas.microsoft.com/office/drawing/2014/main" id="{32F76AA3-EF09-423A-8E4E-BB1AC1B0170F}"/>
+              </a:ext>
+            </a:extLst>
+          </p:cNvPr>
+          <p:cNvSpPr txBox="1"/>
+          <p:nvPr/>
+        </p:nvSpPr>
+        <p:spPr>
+          <a:xfrm>
+            <a:off x="99755" y="3851504"/>
+            <a:ext cx="6094070" cy="253916"/>
+          </a:xfrm>
+          <a:prstGeom prst="rect">
+            <a:avLst/>
+          </a:prstGeom>
+          <a:noFill/>
+        </p:spPr>
+        <p:txBody>
+          <a:bodyPr wrap="square">
+            <a:spAutoFit/>
+          </a:bodyPr>
+          <a:lstStyle/>
+          <a:p>
+            <a:r>
+              <a:rPr lang="en-GB" sz="1050" i="1" dirty="0">
+                <a:hlinkClick r:id="rId6"/>
+              </a:rPr>
+              <a:t>https://stackoverflow.com/questions/292026/is-there-a-good-reason-to-use-upper-case-for-sql-keywords</a:t>
+            </a:r>
+            <a:endParaRPr lang="en-GB" sz="1050" i="1" dirty="0"/>
+          </a:p>
+        </p:txBody>
+      </p:sp>
+    </p:spTree>
+    <p:extLst>
+      <p:ext uri="{BB962C8B-B14F-4D97-AF65-F5344CB8AC3E}">
+        <p14:creationId xmlns:p14="http://schemas.microsoft.com/office/powerpoint/2010/main" val="3528760508"/>
+      </p:ext>
+    </p:extLst>
+  </p:cSld>
+  <p:clrMapOvr>
+    <a:masterClrMapping/>
+  </p:clrMapOvr>
+</p:sld>
+</file>
+
+<file path=ppt/slides/slide7.xml><?xml version="1.0" encoding="utf-8"?>
+<p:sld xmlns:a="http://schemas.openxmlformats.org/drawingml/2006/main" xmlns:r="http://schemas.openxmlformats.org/officeDocument/2006/relationships" xmlns:p="http://schemas.openxmlformats.org/presentationml/2006/main">
+  <p:cSld>
+    <p:spTree>
+      <p:nvGrpSpPr>
+        <p:cNvPr id="1" name=""/>
+        <p:cNvGrpSpPr/>
+        <p:nvPr/>
+      </p:nvGrpSpPr>
+      <p:grpSpPr>
+        <a:xfrm>
+          <a:off x="0" y="0"/>
+          <a:ext cx="0" cy="0"/>
+          <a:chOff x="0" y="0"/>
+          <a:chExt cx="0" cy="0"/>
+        </a:xfrm>
+      </p:grpSpPr>
+      <p:pic>
+        <p:nvPicPr>
+          <p:cNvPr id="2" name="Picture 2" descr="What is SQL? - Tech Monitor">
+            <a:extLst>
+              <a:ext uri="{FF2B5EF4-FFF2-40B4-BE49-F238E27FC236}">
+                <a16:creationId xmlns:a16="http://schemas.microsoft.com/office/drawing/2014/main" id="{6B52F4A0-16E8-43E9-BF09-6D67DF948D7E}"/>
+              </a:ext>
+            </a:extLst>
+          </p:cNvPr>
+          <p:cNvPicPr>
+            <a:picLocks noChangeAspect="1" noChangeArrowheads="1"/>
+          </p:cNvPicPr>
+          <p:nvPr/>
+        </p:nvPicPr>
+        <p:blipFill rotWithShape="1">
+          <a:blip r:embed="rId2">
+            <a:extLst>
+              <a:ext uri="{28A0092B-C50C-407E-A947-70E740481C1C}">
+                <a14:useLocalDpi xmlns:a14="http://schemas.microsoft.com/office/drawing/2010/main" val="0"/>
+              </a:ext>
+            </a:extLst>
+          </a:blip>
+          <a:srcRect l="26148" r="27610"/>
+          <a:stretch/>
+        </p:blipFill>
+        <p:spPr bwMode="auto">
+          <a:xfrm>
+            <a:off x="136857" y="84112"/>
+            <a:ext cx="689376" cy="782667"/>
+          </a:xfrm>
+          <a:prstGeom prst="rect">
+            <a:avLst/>
+          </a:prstGeom>
+          <a:noFill/>
+          <a:extLst>
+            <a:ext uri="{909E8E84-426E-40DD-AFC4-6F175D3DCCD1}">
+              <a14:hiddenFill xmlns:a14="http://schemas.microsoft.com/office/drawing/2010/main">
+                <a:solidFill>
+                  <a:srgbClr val="FFFFFF"/>
+                </a:solidFill>
+              </a14:hiddenFill>
+            </a:ext>
+          </a:extLst>
+        </p:spPr>
+      </p:pic>
+      <p:grpSp>
+        <p:nvGrpSpPr>
+          <p:cNvPr id="18" name="Group 17">
+            <a:extLst>
+              <a:ext uri="{FF2B5EF4-FFF2-40B4-BE49-F238E27FC236}">
+                <a16:creationId xmlns:a16="http://schemas.microsoft.com/office/drawing/2014/main" id="{6185BE9B-87C8-4B46-9293-0E71CF17E76A}"/>
+              </a:ext>
+            </a:extLst>
+          </p:cNvPr>
+          <p:cNvGrpSpPr/>
+          <p:nvPr/>
+        </p:nvGrpSpPr>
+        <p:grpSpPr>
+          <a:xfrm>
+            <a:off x="99755" y="83129"/>
+            <a:ext cx="11953701" cy="872834"/>
+            <a:chOff x="99755" y="83129"/>
+            <a:chExt cx="11953701" cy="872834"/>
+          </a:xfrm>
+        </p:grpSpPr>
+        <p:cxnSp>
+          <p:nvCxnSpPr>
+            <p:cNvPr id="5" name="Straight Connector 4">
+              <a:extLst>
+                <a:ext uri="{FF2B5EF4-FFF2-40B4-BE49-F238E27FC236}">
+                  <a16:creationId xmlns:a16="http://schemas.microsoft.com/office/drawing/2014/main" id="{A8BE4EF8-406C-4035-940C-AB752B29BA18}"/>
+                </a:ext>
+              </a:extLst>
+            </p:cNvPr>
+            <p:cNvCxnSpPr/>
+            <p:nvPr/>
+          </p:nvCxnSpPr>
+          <p:spPr>
+            <a:xfrm>
+              <a:off x="99755" y="955963"/>
+              <a:ext cx="11953701" cy="0"/>
+            </a:xfrm>
+            <a:prstGeom prst="line">
+              <a:avLst/>
+            </a:prstGeom>
+            <a:ln w="19050">
+              <a:solidFill>
+                <a:srgbClr val="0072C6"/>
+              </a:solidFill>
+            </a:ln>
+          </p:spPr>
+          <p:style>
+            <a:lnRef idx="1">
+              <a:schemeClr val="accent1"/>
+            </a:lnRef>
+            <a:fillRef idx="0">
+              <a:schemeClr val="accent1"/>
+            </a:fillRef>
+            <a:effectRef idx="0">
+              <a:schemeClr val="accent1"/>
+            </a:effectRef>
+            <a:fontRef idx="minor">
+              <a:schemeClr val="tx1"/>
+            </a:fontRef>
+          </p:style>
+        </p:cxnSp>
+        <p:sp>
+          <p:nvSpPr>
+            <p:cNvPr id="6" name="TextBox 5">
+              <a:extLst>
+                <a:ext uri="{FF2B5EF4-FFF2-40B4-BE49-F238E27FC236}">
+                  <a16:creationId xmlns:a16="http://schemas.microsoft.com/office/drawing/2014/main" id="{4A5E75BC-B6AC-4138-AB81-9DEC0096C5A8}"/>
+                </a:ext>
+              </a:extLst>
+            </p:cNvPr>
+            <p:cNvSpPr txBox="1"/>
+            <p:nvPr/>
+          </p:nvSpPr>
+          <p:spPr>
+            <a:xfrm>
+              <a:off x="914402" y="191193"/>
+              <a:ext cx="3483032" cy="646331"/>
+            </a:xfrm>
+            <a:prstGeom prst="rect">
+              <a:avLst/>
+            </a:prstGeom>
+            <a:noFill/>
+          </p:spPr>
+          <p:txBody>
+            <a:bodyPr wrap="square" rtlCol="0">
+              <a:spAutoFit/>
+            </a:bodyPr>
+            <a:lstStyle/>
+            <a:p>
+              <a:pPr marL="0" marR="0" lvl="0" indent="0" algn="l" defTabSz="914400" rtl="0" eaLnBrk="1" fontAlgn="auto" latinLnBrk="0" hangingPunct="1">
+                <a:lnSpc>
+                  <a:spcPct val="100000"/>
+                </a:lnSpc>
+                <a:spcBef>
+                  <a:spcPts val="0"/>
+                </a:spcBef>
+                <a:spcAft>
+                  <a:spcPts val="0"/>
+                </a:spcAft>
+                <a:buClrTx/>
+                <a:buSzTx/>
+                <a:buFontTx/>
+                <a:buNone/>
+                <a:tabLst/>
+                <a:defRPr/>
+              </a:pPr>
+              <a:r>
+                <a:rPr kumimoji="0" lang="en-GB" sz="1800" b="0" i="0" u="none" strike="noStrike" kern="1200" cap="none" spc="0" normalizeH="0" baseline="0" noProof="0" dirty="0">
+                  <a:ln>
+                    <a:noFill/>
+                  </a:ln>
+                  <a:solidFill>
+                    <a:prstClr val="black"/>
+                  </a:solidFill>
+                  <a:effectLst/>
+                  <a:uLnTx/>
+                  <a:uFillTx/>
+                  <a:latin typeface="Calibri" panose="020F0502020204030204"/>
+                  <a:ea typeface="+mn-ea"/>
+                  <a:cs typeface="+mn-cs"/>
+                </a:rPr>
+                <a:t>Complete SQL and Database Bootcamp: Zero to Mastery</a:t>
+              </a:r>
+            </a:p>
+          </p:txBody>
+        </p:sp>
+        <p:sp>
+          <p:nvSpPr>
+            <p:cNvPr id="8" name="TextBox 7">
+              <a:extLst>
+                <a:ext uri="{FF2B5EF4-FFF2-40B4-BE49-F238E27FC236}">
+                  <a16:creationId xmlns:a16="http://schemas.microsoft.com/office/drawing/2014/main" id="{C61B684E-FDA7-4625-9CC3-79C17CC59ED7}"/>
+                </a:ext>
+              </a:extLst>
+            </p:cNvPr>
+            <p:cNvSpPr txBox="1"/>
+            <p:nvPr/>
+          </p:nvSpPr>
+          <p:spPr>
+            <a:xfrm>
+              <a:off x="4372494" y="180818"/>
+              <a:ext cx="2686392" cy="369332"/>
+            </a:xfrm>
+            <a:prstGeom prst="rect">
+              <a:avLst/>
+            </a:prstGeom>
+            <a:noFill/>
+          </p:spPr>
+          <p:txBody>
+            <a:bodyPr wrap="square" rtlCol="0">
+              <a:spAutoFit/>
+            </a:bodyPr>
+            <a:lstStyle/>
+            <a:p>
+              <a:pPr marL="0" marR="0" lvl="0" indent="0" algn="l" defTabSz="914400" rtl="0" eaLnBrk="1" fontAlgn="auto" latinLnBrk="0" hangingPunct="1">
+                <a:lnSpc>
+                  <a:spcPct val="100000"/>
+                </a:lnSpc>
+                <a:spcBef>
+                  <a:spcPts val="0"/>
+                </a:spcBef>
+                <a:spcAft>
+                  <a:spcPts val="0"/>
+                </a:spcAft>
+                <a:buClrTx/>
+                <a:buSzTx/>
+                <a:buFontTx/>
+                <a:buNone/>
+                <a:tabLst/>
+                <a:defRPr/>
+              </a:pPr>
+              <a:r>
+                <a:rPr kumimoji="0" lang="en-GB" sz="1800" b="0" i="0" u="none" strike="noStrike" kern="1200" cap="none" spc="0" normalizeH="0" baseline="0" noProof="0" dirty="0">
+                  <a:ln>
+                    <a:noFill/>
+                  </a:ln>
+                  <a:solidFill>
+                    <a:prstClr val="black"/>
+                  </a:solidFill>
+                  <a:effectLst/>
+                  <a:uLnTx/>
+                  <a:uFillTx/>
+                  <a:latin typeface="Calibri" panose="020F0502020204030204"/>
+                  <a:ea typeface="+mn-ea"/>
+                  <a:cs typeface="+mn-cs"/>
+                </a:rPr>
+                <a:t>History &amp; Story of Data</a:t>
+              </a:r>
+            </a:p>
+          </p:txBody>
+        </p:sp>
+        <p:sp>
+          <p:nvSpPr>
+            <p:cNvPr id="9" name="TextBox 8">
+              <a:extLst>
+                <a:ext uri="{FF2B5EF4-FFF2-40B4-BE49-F238E27FC236}">
+                  <a16:creationId xmlns:a16="http://schemas.microsoft.com/office/drawing/2014/main" id="{F6943DFB-F258-4603-B2D8-7E2958123510}"/>
+                </a:ext>
+              </a:extLst>
+            </p:cNvPr>
+            <p:cNvSpPr txBox="1"/>
+            <p:nvPr/>
+          </p:nvSpPr>
+          <p:spPr>
+            <a:xfrm>
+              <a:off x="7197436" y="190641"/>
+              <a:ext cx="2155764" cy="369332"/>
+            </a:xfrm>
+            <a:prstGeom prst="rect">
+              <a:avLst/>
+            </a:prstGeom>
+            <a:noFill/>
+          </p:spPr>
+          <p:txBody>
+            <a:bodyPr wrap="square" rtlCol="0">
+              <a:spAutoFit/>
+            </a:bodyPr>
+            <a:lstStyle/>
+            <a:p>
+              <a:pPr marL="0" marR="0" lvl="0" indent="0" algn="l" defTabSz="914400" rtl="0" eaLnBrk="1" fontAlgn="auto" latinLnBrk="0" hangingPunct="1">
+                <a:lnSpc>
+                  <a:spcPct val="100000"/>
+                </a:lnSpc>
+                <a:spcBef>
+                  <a:spcPts val="0"/>
+                </a:spcBef>
+                <a:spcAft>
+                  <a:spcPts val="0"/>
+                </a:spcAft>
+                <a:buClrTx/>
+                <a:buSzTx/>
+                <a:buFontTx/>
+                <a:buNone/>
+                <a:tabLst/>
+                <a:defRPr/>
+              </a:pPr>
+              <a:r>
+                <a:rPr kumimoji="0" lang="en-GB" sz="1800" b="0" i="0" u="none" strike="noStrike" kern="1200" cap="none" spc="0" normalizeH="0" baseline="0" noProof="0" dirty="0">
+                  <a:ln>
+                    <a:noFill/>
+                  </a:ln>
+                  <a:solidFill>
+                    <a:prstClr val="black"/>
+                  </a:solidFill>
+                  <a:effectLst/>
+                  <a:uLnTx/>
+                  <a:uFillTx/>
+                  <a:latin typeface="Calibri" panose="020F0502020204030204"/>
+                  <a:ea typeface="+mn-ea"/>
+                  <a:cs typeface="+mn-cs"/>
+                </a:rPr>
+                <a:t>Section: 2.18</a:t>
+              </a:r>
+            </a:p>
+          </p:txBody>
+        </p:sp>
+        <p:sp>
+          <p:nvSpPr>
+            <p:cNvPr id="10" name="TextBox 9">
+              <a:extLst>
+                <a:ext uri="{FF2B5EF4-FFF2-40B4-BE49-F238E27FC236}">
+                  <a16:creationId xmlns:a16="http://schemas.microsoft.com/office/drawing/2014/main" id="{4E568F0D-7E90-4A0C-8070-6C806D992954}"/>
+                </a:ext>
+              </a:extLst>
+            </p:cNvPr>
+            <p:cNvSpPr txBox="1"/>
+            <p:nvPr/>
+          </p:nvSpPr>
+          <p:spPr>
+            <a:xfrm>
+              <a:off x="9534699" y="180818"/>
+              <a:ext cx="2155764" cy="369332"/>
+            </a:xfrm>
+            <a:prstGeom prst="rect">
+              <a:avLst/>
+            </a:prstGeom>
+            <a:noFill/>
+          </p:spPr>
+          <p:txBody>
+            <a:bodyPr wrap="square" rtlCol="0">
+              <a:spAutoFit/>
+            </a:bodyPr>
+            <a:lstStyle/>
+            <a:p>
+              <a:pPr marL="0" marR="0" lvl="0" indent="0" algn="l" defTabSz="914400" rtl="0" eaLnBrk="1" fontAlgn="auto" latinLnBrk="0" hangingPunct="1">
+                <a:lnSpc>
+                  <a:spcPct val="100000"/>
+                </a:lnSpc>
+                <a:spcBef>
+                  <a:spcPts val="0"/>
+                </a:spcBef>
+                <a:spcAft>
+                  <a:spcPts val="0"/>
+                </a:spcAft>
+                <a:buClrTx/>
+                <a:buSzTx/>
+                <a:buFontTx/>
+                <a:buNone/>
+                <a:tabLst/>
+                <a:defRPr/>
+              </a:pPr>
+              <a:r>
+                <a:rPr kumimoji="0" lang="en-GB" sz="1800" b="0" i="0" u="none" strike="noStrike" kern="1200" cap="none" spc="0" normalizeH="0" baseline="0" noProof="0" dirty="0">
+                  <a:ln>
+                    <a:noFill/>
+                  </a:ln>
+                  <a:solidFill>
+                    <a:prstClr val="black"/>
+                  </a:solidFill>
+                  <a:effectLst/>
+                  <a:uLnTx/>
+                  <a:uFillTx/>
+                  <a:latin typeface="Calibri" panose="020F0502020204030204"/>
+                  <a:ea typeface="+mn-ea"/>
+                  <a:cs typeface="+mn-cs"/>
+                </a:rPr>
+                <a:t>Date: 11/01/22 </a:t>
+              </a:r>
+            </a:p>
+          </p:txBody>
+        </p:sp>
+        <p:cxnSp>
+          <p:nvCxnSpPr>
+            <p:cNvPr id="11" name="Straight Connector 10">
+              <a:extLst>
+                <a:ext uri="{FF2B5EF4-FFF2-40B4-BE49-F238E27FC236}">
+                  <a16:creationId xmlns:a16="http://schemas.microsoft.com/office/drawing/2014/main" id="{F70ABCF3-BE60-426F-8C8C-059C854869C6}"/>
+                </a:ext>
+              </a:extLst>
+            </p:cNvPr>
+            <p:cNvCxnSpPr>
+              <a:cxnSpLocks/>
+            </p:cNvCxnSpPr>
+            <p:nvPr/>
+          </p:nvCxnSpPr>
+          <p:spPr>
+            <a:xfrm flipV="1">
+              <a:off x="4267202" y="93505"/>
+              <a:ext cx="1" cy="754394"/>
+            </a:xfrm>
+            <a:prstGeom prst="line">
+              <a:avLst/>
+            </a:prstGeom>
+            <a:ln w="19050">
+              <a:solidFill>
+                <a:srgbClr val="0072C6"/>
+              </a:solidFill>
+            </a:ln>
+          </p:spPr>
+          <p:style>
+            <a:lnRef idx="1">
+              <a:schemeClr val="accent1"/>
+            </a:lnRef>
+            <a:fillRef idx="0">
+              <a:schemeClr val="accent1"/>
+            </a:fillRef>
+            <a:effectRef idx="0">
+              <a:schemeClr val="accent1"/>
+            </a:effectRef>
+            <a:fontRef idx="minor">
+              <a:schemeClr val="tx1"/>
+            </a:fontRef>
+          </p:style>
+        </p:cxnSp>
+        <p:cxnSp>
+          <p:nvCxnSpPr>
+            <p:cNvPr id="15" name="Straight Connector 14">
+              <a:extLst>
+                <a:ext uri="{FF2B5EF4-FFF2-40B4-BE49-F238E27FC236}">
+                  <a16:creationId xmlns:a16="http://schemas.microsoft.com/office/drawing/2014/main" id="{D7F750D7-69E5-4FC3-AFB5-134C7587DE8B}"/>
+                </a:ext>
+              </a:extLst>
+            </p:cNvPr>
+            <p:cNvCxnSpPr>
+              <a:cxnSpLocks/>
+            </p:cNvCxnSpPr>
+            <p:nvPr/>
+          </p:nvCxnSpPr>
+          <p:spPr>
+            <a:xfrm flipV="1">
+              <a:off x="7154489" y="88317"/>
+              <a:ext cx="1" cy="754394"/>
+            </a:xfrm>
+            <a:prstGeom prst="line">
+              <a:avLst/>
+            </a:prstGeom>
+            <a:ln w="19050">
+              <a:solidFill>
+                <a:srgbClr val="0072C6"/>
+              </a:solidFill>
+            </a:ln>
+          </p:spPr>
+          <p:style>
+            <a:lnRef idx="1">
+              <a:schemeClr val="accent1"/>
+            </a:lnRef>
+            <a:fillRef idx="0">
+              <a:schemeClr val="accent1"/>
+            </a:fillRef>
+            <a:effectRef idx="0">
+              <a:schemeClr val="accent1"/>
+            </a:effectRef>
+            <a:fontRef idx="minor">
+              <a:schemeClr val="tx1"/>
+            </a:fontRef>
+          </p:style>
+        </p:cxnSp>
+        <p:cxnSp>
+          <p:nvCxnSpPr>
+            <p:cNvPr id="16" name="Straight Connector 15">
+              <a:extLst>
+                <a:ext uri="{FF2B5EF4-FFF2-40B4-BE49-F238E27FC236}">
+                  <a16:creationId xmlns:a16="http://schemas.microsoft.com/office/drawing/2014/main" id="{90F03633-4CAB-4B57-BF94-CF91E87AB7AE}"/>
+                </a:ext>
+              </a:extLst>
+            </p:cNvPr>
+            <p:cNvCxnSpPr>
+              <a:cxnSpLocks/>
+            </p:cNvCxnSpPr>
+            <p:nvPr/>
+          </p:nvCxnSpPr>
+          <p:spPr>
+            <a:xfrm flipV="1">
+              <a:off x="9491750" y="83129"/>
+              <a:ext cx="1" cy="754394"/>
+            </a:xfrm>
+            <a:prstGeom prst="line">
+              <a:avLst/>
+            </a:prstGeom>
+            <a:ln w="19050">
+              <a:solidFill>
+                <a:srgbClr val="0072C6"/>
+              </a:solidFill>
+            </a:ln>
+          </p:spPr>
+          <p:style>
+            <a:lnRef idx="1">
+              <a:schemeClr val="accent1"/>
+            </a:lnRef>
+            <a:fillRef idx="0">
+              <a:schemeClr val="accent1"/>
+            </a:fillRef>
+            <a:effectRef idx="0">
+              <a:schemeClr val="accent1"/>
+            </a:effectRef>
+            <a:fontRef idx="minor">
+              <a:schemeClr val="tx1"/>
+            </a:fontRef>
+          </p:style>
+        </p:cxnSp>
+      </p:grpSp>
+      <p:sp>
+        <p:nvSpPr>
+          <p:cNvPr id="19" name="Rectangle 18">
+            <a:extLst>
+              <a:ext uri="{FF2B5EF4-FFF2-40B4-BE49-F238E27FC236}">
+                <a16:creationId xmlns:a16="http://schemas.microsoft.com/office/drawing/2014/main" id="{ED545263-4F3E-40B3-B602-E17FBC18342A}"/>
+              </a:ext>
+            </a:extLst>
+          </p:cNvPr>
+          <p:cNvSpPr/>
+          <p:nvPr/>
+        </p:nvSpPr>
+        <p:spPr>
+          <a:xfrm>
+            <a:off x="269475" y="1074403"/>
+            <a:ext cx="11328358" cy="3347123"/>
+          </a:xfrm>
+          <a:prstGeom prst="rect">
+            <a:avLst/>
+          </a:prstGeom>
+          <a:noFill/>
+          <a:ln>
+            <a:noFill/>
+          </a:ln>
+        </p:spPr>
+        <p:style>
+          <a:lnRef idx="2">
+            <a:schemeClr val="accent1">
+              <a:shade val="50000"/>
+            </a:schemeClr>
+          </a:lnRef>
+          <a:fillRef idx="1">
+            <a:schemeClr val="accent1"/>
+          </a:fillRef>
+          <a:effectRef idx="0">
+            <a:schemeClr val="accent1"/>
+          </a:effectRef>
+          <a:fontRef idx="minor">
+            <a:schemeClr val="lt1"/>
+          </a:fontRef>
+        </p:style>
+        <p:txBody>
+          <a:bodyPr rtlCol="0" anchor="t"/>
+          <a:lstStyle/>
+          <a:p>
+            <a:pPr marL="0" marR="0" lvl="0" indent="0" algn="l" defTabSz="914400" rtl="0" eaLnBrk="1" fontAlgn="auto" latinLnBrk="0" hangingPunct="1">
+              <a:lnSpc>
+                <a:spcPct val="120000"/>
+              </a:lnSpc>
+              <a:spcBef>
+                <a:spcPts val="0"/>
+              </a:spcBef>
+              <a:spcAft>
+                <a:spcPts val="0"/>
+              </a:spcAft>
+              <a:buClrTx/>
+              <a:buSzTx/>
+              <a:buFontTx/>
+              <a:buNone/>
+              <a:tabLst/>
+              <a:defRPr/>
+            </a:pPr>
+            <a:r>
+              <a:rPr kumimoji="0" lang="en-GB" sz="1600" b="1" i="0" u="none" strike="noStrike" kern="1200" cap="none" spc="0" normalizeH="0" baseline="0" noProof="0" dirty="0">
+                <a:ln>
+                  <a:noFill/>
+                </a:ln>
+                <a:solidFill>
+                  <a:prstClr val="black"/>
+                </a:solidFill>
+                <a:effectLst/>
+                <a:uLnTx/>
+                <a:uFillTx/>
+                <a:latin typeface="Calibri" panose="020F0502020204030204"/>
+                <a:ea typeface="+mn-ea"/>
+                <a:cs typeface="+mn-cs"/>
+              </a:rPr>
+              <a:t>Declarative vs Imperative Programming</a:t>
+            </a:r>
+          </a:p>
+          <a:p>
+            <a:pPr marL="0" marR="0" lvl="0" indent="0" algn="l" defTabSz="914400" rtl="0" eaLnBrk="1" fontAlgn="auto" latinLnBrk="0" hangingPunct="1">
+              <a:lnSpc>
+                <a:spcPct val="120000"/>
+              </a:lnSpc>
+              <a:spcBef>
+                <a:spcPts val="0"/>
+              </a:spcBef>
+              <a:spcAft>
+                <a:spcPts val="0"/>
+              </a:spcAft>
+              <a:buClrTx/>
+              <a:buSzTx/>
+              <a:buFontTx/>
+              <a:buNone/>
+              <a:tabLst/>
+              <a:defRPr/>
+            </a:pPr>
+            <a:endParaRPr lang="en-GB" sz="1600" b="1" dirty="0">
+              <a:solidFill>
+                <a:prstClr val="black"/>
+              </a:solidFill>
+              <a:latin typeface="Calibri" panose="020F0502020204030204"/>
+            </a:endParaRPr>
+          </a:p>
+          <a:p>
+            <a:pPr marL="0" marR="0" lvl="0" indent="0" algn="l" defTabSz="914400" rtl="0" eaLnBrk="1" fontAlgn="auto" latinLnBrk="0" hangingPunct="1">
+              <a:lnSpc>
+                <a:spcPct val="120000"/>
+              </a:lnSpc>
+              <a:spcBef>
+                <a:spcPts val="0"/>
+              </a:spcBef>
+              <a:spcAft>
+                <a:spcPts val="0"/>
+              </a:spcAft>
+              <a:buClrTx/>
+              <a:buSzTx/>
+              <a:buFontTx/>
+              <a:buNone/>
+              <a:tabLst/>
+              <a:defRPr/>
+            </a:pPr>
+            <a:r>
+              <a:rPr kumimoji="0" lang="en-GB" sz="1600" i="0" u="none" strike="noStrike" kern="1200" cap="none" spc="0" normalizeH="0" baseline="0" noProof="0" dirty="0">
+                <a:ln>
+                  <a:noFill/>
+                </a:ln>
+                <a:solidFill>
+                  <a:prstClr val="black"/>
+                </a:solidFill>
+                <a:effectLst/>
+                <a:uLnTx/>
+                <a:uFillTx/>
+                <a:latin typeface="Calibri" panose="020F0502020204030204"/>
+                <a:ea typeface="+mn-ea"/>
+                <a:cs typeface="+mn-cs"/>
+              </a:rPr>
+              <a:t>In declarative we say what will happen, but do not define how to achieve this. This is SQL, we say we want all the data on managers in a ‘User’ table using SELECT * FROM ‘User’ WHERE role = ‘manager’. We do not specify to SQL how to perform this task we simply state what we would like.</a:t>
+            </a:r>
+          </a:p>
+          <a:p>
+            <a:pPr marL="0" marR="0" lvl="0" indent="0" algn="l" defTabSz="914400" rtl="0" eaLnBrk="1" fontAlgn="auto" latinLnBrk="0" hangingPunct="1">
+              <a:lnSpc>
+                <a:spcPct val="120000"/>
+              </a:lnSpc>
+              <a:spcBef>
+                <a:spcPts val="0"/>
+              </a:spcBef>
+              <a:spcAft>
+                <a:spcPts val="0"/>
+              </a:spcAft>
+              <a:buClrTx/>
+              <a:buSzTx/>
+              <a:buFontTx/>
+              <a:buNone/>
+              <a:tabLst/>
+              <a:defRPr/>
+            </a:pPr>
+            <a:endParaRPr lang="en-GB" sz="1600" dirty="0">
+              <a:solidFill>
+                <a:prstClr val="black"/>
+              </a:solidFill>
+              <a:latin typeface="Calibri" panose="020F0502020204030204"/>
+            </a:endParaRPr>
+          </a:p>
+          <a:p>
+            <a:pPr marL="0" marR="0" lvl="0" indent="0" algn="l" defTabSz="914400" rtl="0" eaLnBrk="1" fontAlgn="auto" latinLnBrk="0" hangingPunct="1">
+              <a:lnSpc>
+                <a:spcPct val="120000"/>
+              </a:lnSpc>
+              <a:spcBef>
+                <a:spcPts val="0"/>
+              </a:spcBef>
+              <a:spcAft>
+                <a:spcPts val="0"/>
+              </a:spcAft>
+              <a:buClrTx/>
+              <a:buSzTx/>
+              <a:buFontTx/>
+              <a:buNone/>
+              <a:tabLst/>
+              <a:defRPr/>
+            </a:pPr>
+            <a:r>
+              <a:rPr kumimoji="0" lang="en-GB" sz="1600" i="0" u="none" strike="noStrike" kern="1200" cap="none" spc="0" normalizeH="0" baseline="0" noProof="0" dirty="0">
+                <a:ln>
+                  <a:noFill/>
+                </a:ln>
+                <a:solidFill>
+                  <a:prstClr val="black"/>
+                </a:solidFill>
+                <a:effectLst/>
+                <a:uLnTx/>
+                <a:uFillTx/>
+                <a:latin typeface="Calibri" panose="020F0502020204030204"/>
+                <a:ea typeface="+mn-ea"/>
+                <a:cs typeface="+mn-cs"/>
+              </a:rPr>
+              <a:t>In imperative programming (e.g. Java), we must state how to achieve something. </a:t>
+            </a:r>
+            <a:r>
+              <a:rPr lang="en-GB" sz="1600" dirty="0">
+                <a:solidFill>
+                  <a:prstClr val="black"/>
+                </a:solidFill>
+                <a:latin typeface="Calibri" panose="020F0502020204030204"/>
+              </a:rPr>
+              <a:t>Therefore we might need to tell the program where to read from a hard drive. In python we can do both declarative and imperative.</a:t>
+            </a:r>
+          </a:p>
+          <a:p>
+            <a:pPr marL="0" marR="0" lvl="0" indent="0" algn="l" defTabSz="914400" rtl="0" eaLnBrk="1" fontAlgn="auto" latinLnBrk="0" hangingPunct="1">
+              <a:lnSpc>
+                <a:spcPct val="120000"/>
+              </a:lnSpc>
+              <a:spcBef>
+                <a:spcPts val="0"/>
+              </a:spcBef>
+              <a:spcAft>
+                <a:spcPts val="0"/>
+              </a:spcAft>
+              <a:buClrTx/>
+              <a:buSzTx/>
+              <a:buFontTx/>
+              <a:buNone/>
+              <a:tabLst/>
+              <a:defRPr/>
+            </a:pPr>
+            <a:endParaRPr kumimoji="0" lang="en-GB" sz="1600" i="0" u="none" strike="noStrike" kern="1200" cap="none" spc="0" normalizeH="0" baseline="0" noProof="0" dirty="0">
+              <a:ln>
+                <a:noFill/>
+              </a:ln>
+              <a:solidFill>
+                <a:prstClr val="black"/>
+              </a:solidFill>
+              <a:effectLst/>
+              <a:uLnTx/>
+              <a:uFillTx/>
+              <a:latin typeface="Calibri" panose="020F0502020204030204"/>
+              <a:ea typeface="+mn-ea"/>
+              <a:cs typeface="+mn-cs"/>
+            </a:endParaRPr>
+          </a:p>
+          <a:p>
+            <a:pPr marL="0" marR="0" lvl="0" indent="0" algn="l" defTabSz="914400" rtl="0" eaLnBrk="1" fontAlgn="auto" latinLnBrk="0" hangingPunct="1">
+              <a:lnSpc>
+                <a:spcPct val="120000"/>
+              </a:lnSpc>
+              <a:spcBef>
+                <a:spcPts val="0"/>
+              </a:spcBef>
+              <a:spcAft>
+                <a:spcPts val="0"/>
+              </a:spcAft>
+              <a:buClrTx/>
+              <a:buSzTx/>
+              <a:buFontTx/>
+              <a:buNone/>
+              <a:tabLst/>
+              <a:defRPr/>
+            </a:pPr>
+            <a:r>
+              <a:rPr lang="en-GB" sz="1600" dirty="0">
+                <a:solidFill>
+                  <a:prstClr val="black"/>
+                </a:solidFill>
+                <a:latin typeface="Calibri" panose="020F0502020204030204"/>
+              </a:rPr>
+              <a:t>Declarative is powerful because of its simplicity. Imperative on the other hand is far more flexible.</a:t>
+            </a:r>
+            <a:endParaRPr kumimoji="0" lang="en-GB" sz="1600" i="0" u="none" strike="noStrike" kern="1200" cap="none" spc="0" normalizeH="0" baseline="0" noProof="0" dirty="0">
+              <a:ln>
+                <a:noFill/>
+              </a:ln>
+              <a:solidFill>
+                <a:prstClr val="black"/>
+              </a:solidFill>
+              <a:effectLst/>
+              <a:uLnTx/>
+              <a:uFillTx/>
+              <a:latin typeface="Calibri" panose="020F0502020204030204"/>
+              <a:ea typeface="+mn-ea"/>
+              <a:cs typeface="+mn-cs"/>
+            </a:endParaRPr>
+          </a:p>
+        </p:txBody>
+      </p:sp>
+      <p:pic>
+        <p:nvPicPr>
+          <p:cNvPr id="4" name="Picture 3">
+            <a:extLst>
+              <a:ext uri="{FF2B5EF4-FFF2-40B4-BE49-F238E27FC236}">
+                <a16:creationId xmlns:a16="http://schemas.microsoft.com/office/drawing/2014/main" id="{81C67551-6DEB-412F-AF40-FFCFBCCAD49A}"/>
+              </a:ext>
+            </a:extLst>
+          </p:cNvPr>
+          <p:cNvPicPr>
+            <a:picLocks noChangeAspect="1"/>
+          </p:cNvPicPr>
+          <p:nvPr/>
+        </p:nvPicPr>
+        <p:blipFill>
+          <a:blip r:embed="rId3"/>
+          <a:stretch>
+            <a:fillRect/>
+          </a:stretch>
+        </p:blipFill>
+        <p:spPr>
+          <a:xfrm>
+            <a:off x="3195090" y="4198862"/>
+            <a:ext cx="6006783" cy="2386921"/>
+          </a:xfrm>
+          <a:prstGeom prst="rect">
+            <a:avLst/>
+          </a:prstGeom>
+        </p:spPr>
+      </p:pic>
+    </p:spTree>
+    <p:extLst>
+      <p:ext uri="{BB962C8B-B14F-4D97-AF65-F5344CB8AC3E}">
+        <p14:creationId xmlns:p14="http://schemas.microsoft.com/office/powerpoint/2010/main" val="3818097089"/>
+      </p:ext>
+    </p:extLst>
+  </p:cSld>
+  <p:clrMapOvr>
+    <a:masterClrMapping/>
+  </p:clrMapOvr>
+</p:sld>
+</file>
+
+<file path=ppt/slides/slide8.xml><?xml version="1.0" encoding="utf-8"?>
+<p:sld xmlns:a="http://schemas.openxmlformats.org/drawingml/2006/main" xmlns:r="http://schemas.openxmlformats.org/officeDocument/2006/relationships" xmlns:p="http://schemas.openxmlformats.org/presentationml/2006/main">
+  <p:cSld>
+    <p:spTree>
+      <p:nvGrpSpPr>
+        <p:cNvPr id="1" name=""/>
+        <p:cNvGrpSpPr/>
+        <p:nvPr/>
+      </p:nvGrpSpPr>
+      <p:grpSpPr>
+        <a:xfrm>
+          <a:off x="0" y="0"/>
+          <a:ext cx="0" cy="0"/>
+          <a:chOff x="0" y="0"/>
+          <a:chExt cx="0" cy="0"/>
+        </a:xfrm>
+      </p:grpSpPr>
+      <p:pic>
+        <p:nvPicPr>
+          <p:cNvPr id="2" name="Picture 2" descr="What is SQL? - Tech Monitor">
+            <a:extLst>
+              <a:ext uri="{FF2B5EF4-FFF2-40B4-BE49-F238E27FC236}">
+                <a16:creationId xmlns:a16="http://schemas.microsoft.com/office/drawing/2014/main" id="{6B52F4A0-16E8-43E9-BF09-6D67DF948D7E}"/>
+              </a:ext>
+            </a:extLst>
+          </p:cNvPr>
+          <p:cNvPicPr>
+            <a:picLocks noChangeAspect="1" noChangeArrowheads="1"/>
+          </p:cNvPicPr>
+          <p:nvPr/>
+        </p:nvPicPr>
+        <p:blipFill rotWithShape="1">
+          <a:blip r:embed="rId2">
+            <a:extLst>
+              <a:ext uri="{28A0092B-C50C-407E-A947-70E740481C1C}">
+                <a14:useLocalDpi xmlns:a14="http://schemas.microsoft.com/office/drawing/2010/main" val="0"/>
+              </a:ext>
+            </a:extLst>
+          </a:blip>
+          <a:srcRect l="26148" r="27610"/>
+          <a:stretch/>
+        </p:blipFill>
+        <p:spPr bwMode="auto">
+          <a:xfrm>
+            <a:off x="136857" y="84112"/>
+            <a:ext cx="689376" cy="782667"/>
+          </a:xfrm>
+          <a:prstGeom prst="rect">
+            <a:avLst/>
+          </a:prstGeom>
+          <a:noFill/>
+          <a:extLst>
+            <a:ext uri="{909E8E84-426E-40DD-AFC4-6F175D3DCCD1}">
+              <a14:hiddenFill xmlns:a14="http://schemas.microsoft.com/office/drawing/2010/main">
+                <a:solidFill>
+                  <a:srgbClr val="FFFFFF"/>
+                </a:solidFill>
+              </a14:hiddenFill>
+            </a:ext>
+          </a:extLst>
+        </p:spPr>
+      </p:pic>
+      <p:grpSp>
+        <p:nvGrpSpPr>
+          <p:cNvPr id="18" name="Group 17">
+            <a:extLst>
+              <a:ext uri="{FF2B5EF4-FFF2-40B4-BE49-F238E27FC236}">
+                <a16:creationId xmlns:a16="http://schemas.microsoft.com/office/drawing/2014/main" id="{6185BE9B-87C8-4B46-9293-0E71CF17E76A}"/>
+              </a:ext>
+            </a:extLst>
+          </p:cNvPr>
+          <p:cNvGrpSpPr/>
+          <p:nvPr/>
+        </p:nvGrpSpPr>
+        <p:grpSpPr>
+          <a:xfrm>
+            <a:off x="99755" y="83129"/>
+            <a:ext cx="11953701" cy="872834"/>
+            <a:chOff x="99755" y="83129"/>
+            <a:chExt cx="11953701" cy="872834"/>
+          </a:xfrm>
+        </p:grpSpPr>
+        <p:cxnSp>
+          <p:nvCxnSpPr>
+            <p:cNvPr id="5" name="Straight Connector 4">
+              <a:extLst>
+                <a:ext uri="{FF2B5EF4-FFF2-40B4-BE49-F238E27FC236}">
+                  <a16:creationId xmlns:a16="http://schemas.microsoft.com/office/drawing/2014/main" id="{A8BE4EF8-406C-4035-940C-AB752B29BA18}"/>
+                </a:ext>
+              </a:extLst>
+            </p:cNvPr>
+            <p:cNvCxnSpPr/>
+            <p:nvPr/>
+          </p:nvCxnSpPr>
+          <p:spPr>
+            <a:xfrm>
+              <a:off x="99755" y="955963"/>
+              <a:ext cx="11953701" cy="0"/>
+            </a:xfrm>
+            <a:prstGeom prst="line">
+              <a:avLst/>
+            </a:prstGeom>
+            <a:ln w="19050">
+              <a:solidFill>
+                <a:srgbClr val="0072C6"/>
+              </a:solidFill>
+            </a:ln>
+          </p:spPr>
+          <p:style>
+            <a:lnRef idx="1">
+              <a:schemeClr val="accent1"/>
+            </a:lnRef>
+            <a:fillRef idx="0">
+              <a:schemeClr val="accent1"/>
+            </a:fillRef>
+            <a:effectRef idx="0">
+              <a:schemeClr val="accent1"/>
+            </a:effectRef>
+            <a:fontRef idx="minor">
+              <a:schemeClr val="tx1"/>
+            </a:fontRef>
+          </p:style>
+        </p:cxnSp>
+        <p:sp>
+          <p:nvSpPr>
+            <p:cNvPr id="6" name="TextBox 5">
+              <a:extLst>
+                <a:ext uri="{FF2B5EF4-FFF2-40B4-BE49-F238E27FC236}">
+                  <a16:creationId xmlns:a16="http://schemas.microsoft.com/office/drawing/2014/main" id="{4A5E75BC-B6AC-4138-AB81-9DEC0096C5A8}"/>
+                </a:ext>
+              </a:extLst>
+            </p:cNvPr>
+            <p:cNvSpPr txBox="1"/>
+            <p:nvPr/>
+          </p:nvSpPr>
+          <p:spPr>
+            <a:xfrm>
+              <a:off x="914402" y="191193"/>
+              <a:ext cx="3483032" cy="646331"/>
+            </a:xfrm>
+            <a:prstGeom prst="rect">
+              <a:avLst/>
+            </a:prstGeom>
+            <a:noFill/>
+          </p:spPr>
+          <p:txBody>
+            <a:bodyPr wrap="square" rtlCol="0">
+              <a:spAutoFit/>
+            </a:bodyPr>
+            <a:lstStyle/>
+            <a:p>
+              <a:pPr marL="0" marR="0" lvl="0" indent="0" algn="l" defTabSz="914400" rtl="0" eaLnBrk="1" fontAlgn="auto" latinLnBrk="0" hangingPunct="1">
+                <a:lnSpc>
+                  <a:spcPct val="100000"/>
+                </a:lnSpc>
+                <a:spcBef>
+                  <a:spcPts val="0"/>
+                </a:spcBef>
+                <a:spcAft>
+                  <a:spcPts val="0"/>
+                </a:spcAft>
+                <a:buClrTx/>
+                <a:buSzTx/>
+                <a:buFontTx/>
+                <a:buNone/>
+                <a:tabLst/>
+                <a:defRPr/>
+              </a:pPr>
+              <a:r>
+                <a:rPr kumimoji="0" lang="en-GB" sz="1800" b="0" i="0" u="none" strike="noStrike" kern="1200" cap="none" spc="0" normalizeH="0" baseline="0" noProof="0" dirty="0">
+                  <a:ln>
+                    <a:noFill/>
+                  </a:ln>
+                  <a:solidFill>
+                    <a:prstClr val="black"/>
+                  </a:solidFill>
+                  <a:effectLst/>
+                  <a:uLnTx/>
+                  <a:uFillTx/>
+                  <a:latin typeface="Calibri" panose="020F0502020204030204"/>
+                  <a:ea typeface="+mn-ea"/>
+                  <a:cs typeface="+mn-cs"/>
+                </a:rPr>
+                <a:t>Complete SQL and Database Bootcamp: Zero to Mastery</a:t>
+              </a:r>
+            </a:p>
+          </p:txBody>
+        </p:sp>
+        <p:sp>
+          <p:nvSpPr>
+            <p:cNvPr id="8" name="TextBox 7">
+              <a:extLst>
+                <a:ext uri="{FF2B5EF4-FFF2-40B4-BE49-F238E27FC236}">
+                  <a16:creationId xmlns:a16="http://schemas.microsoft.com/office/drawing/2014/main" id="{C61B684E-FDA7-4625-9CC3-79C17CC59ED7}"/>
+                </a:ext>
+              </a:extLst>
+            </p:cNvPr>
+            <p:cNvSpPr txBox="1"/>
+            <p:nvPr/>
+          </p:nvSpPr>
+          <p:spPr>
+            <a:xfrm>
+              <a:off x="4372494" y="180818"/>
+              <a:ext cx="2686392" cy="369332"/>
+            </a:xfrm>
+            <a:prstGeom prst="rect">
+              <a:avLst/>
+            </a:prstGeom>
+            <a:noFill/>
+          </p:spPr>
+          <p:txBody>
+            <a:bodyPr wrap="square" rtlCol="0">
+              <a:spAutoFit/>
+            </a:bodyPr>
+            <a:lstStyle/>
+            <a:p>
+              <a:pPr marL="0" marR="0" lvl="0" indent="0" algn="l" defTabSz="914400" rtl="0" eaLnBrk="1" fontAlgn="auto" latinLnBrk="0" hangingPunct="1">
+                <a:lnSpc>
+                  <a:spcPct val="100000"/>
+                </a:lnSpc>
+                <a:spcBef>
+                  <a:spcPts val="0"/>
+                </a:spcBef>
+                <a:spcAft>
+                  <a:spcPts val="0"/>
+                </a:spcAft>
+                <a:buClrTx/>
+                <a:buSzTx/>
+                <a:buFontTx/>
+                <a:buNone/>
+                <a:tabLst/>
+                <a:defRPr/>
+              </a:pPr>
+              <a:r>
+                <a:rPr kumimoji="0" lang="en-GB" sz="1800" b="0" i="0" u="none" strike="noStrike" kern="1200" cap="none" spc="0" normalizeH="0" baseline="0" noProof="0" dirty="0">
+                  <a:ln>
+                    <a:noFill/>
+                  </a:ln>
+                  <a:solidFill>
+                    <a:prstClr val="black"/>
+                  </a:solidFill>
+                  <a:effectLst/>
+                  <a:uLnTx/>
+                  <a:uFillTx/>
+                  <a:latin typeface="Calibri" panose="020F0502020204030204"/>
+                  <a:ea typeface="+mn-ea"/>
+                  <a:cs typeface="+mn-cs"/>
+                </a:rPr>
+                <a:t>History &amp; Story of Data</a:t>
+              </a:r>
+            </a:p>
+          </p:txBody>
+        </p:sp>
+        <p:sp>
+          <p:nvSpPr>
+            <p:cNvPr id="9" name="TextBox 8">
+              <a:extLst>
+                <a:ext uri="{FF2B5EF4-FFF2-40B4-BE49-F238E27FC236}">
+                  <a16:creationId xmlns:a16="http://schemas.microsoft.com/office/drawing/2014/main" id="{F6943DFB-F258-4603-B2D8-7E2958123510}"/>
+                </a:ext>
+              </a:extLst>
+            </p:cNvPr>
+            <p:cNvSpPr txBox="1"/>
+            <p:nvPr/>
+          </p:nvSpPr>
+          <p:spPr>
+            <a:xfrm>
+              <a:off x="7197436" y="190641"/>
+              <a:ext cx="2155764" cy="369332"/>
+            </a:xfrm>
+            <a:prstGeom prst="rect">
+              <a:avLst/>
+            </a:prstGeom>
+            <a:noFill/>
+          </p:spPr>
+          <p:txBody>
+            <a:bodyPr wrap="square" rtlCol="0">
+              <a:spAutoFit/>
+            </a:bodyPr>
+            <a:lstStyle/>
+            <a:p>
+              <a:pPr marL="0" marR="0" lvl="0" indent="0" algn="l" defTabSz="914400" rtl="0" eaLnBrk="1" fontAlgn="auto" latinLnBrk="0" hangingPunct="1">
+                <a:lnSpc>
+                  <a:spcPct val="100000"/>
+                </a:lnSpc>
+                <a:spcBef>
+                  <a:spcPts val="0"/>
+                </a:spcBef>
+                <a:spcAft>
+                  <a:spcPts val="0"/>
+                </a:spcAft>
+                <a:buClrTx/>
+                <a:buSzTx/>
+                <a:buFontTx/>
+                <a:buNone/>
+                <a:tabLst/>
+                <a:defRPr/>
+              </a:pPr>
+              <a:r>
+                <a:rPr kumimoji="0" lang="en-GB" sz="1800" b="0" i="0" u="none" strike="noStrike" kern="1200" cap="none" spc="0" normalizeH="0" baseline="0" noProof="0" dirty="0">
+                  <a:ln>
+                    <a:noFill/>
+                  </a:ln>
+                  <a:solidFill>
+                    <a:prstClr val="black"/>
+                  </a:solidFill>
+                  <a:effectLst/>
+                  <a:uLnTx/>
+                  <a:uFillTx/>
+                  <a:latin typeface="Calibri" panose="020F0502020204030204"/>
+                  <a:ea typeface="+mn-ea"/>
+                  <a:cs typeface="+mn-cs"/>
+                </a:rPr>
+                <a:t>Section: 2.19</a:t>
+              </a:r>
+            </a:p>
+          </p:txBody>
+        </p:sp>
+        <p:sp>
+          <p:nvSpPr>
+            <p:cNvPr id="10" name="TextBox 9">
+              <a:extLst>
+                <a:ext uri="{FF2B5EF4-FFF2-40B4-BE49-F238E27FC236}">
+                  <a16:creationId xmlns:a16="http://schemas.microsoft.com/office/drawing/2014/main" id="{4E568F0D-7E90-4A0C-8070-6C806D992954}"/>
+                </a:ext>
+              </a:extLst>
+            </p:cNvPr>
+            <p:cNvSpPr txBox="1"/>
+            <p:nvPr/>
+          </p:nvSpPr>
+          <p:spPr>
+            <a:xfrm>
+              <a:off x="9534699" y="180818"/>
+              <a:ext cx="2155764" cy="369332"/>
+            </a:xfrm>
+            <a:prstGeom prst="rect">
+              <a:avLst/>
+            </a:prstGeom>
+            <a:noFill/>
+          </p:spPr>
+          <p:txBody>
+            <a:bodyPr wrap="square" rtlCol="0">
+              <a:spAutoFit/>
+            </a:bodyPr>
+            <a:lstStyle/>
+            <a:p>
+              <a:pPr marL="0" marR="0" lvl="0" indent="0" algn="l" defTabSz="914400" rtl="0" eaLnBrk="1" fontAlgn="auto" latinLnBrk="0" hangingPunct="1">
+                <a:lnSpc>
+                  <a:spcPct val="100000"/>
+                </a:lnSpc>
+                <a:spcBef>
+                  <a:spcPts val="0"/>
+                </a:spcBef>
+                <a:spcAft>
+                  <a:spcPts val="0"/>
+                </a:spcAft>
+                <a:buClrTx/>
+                <a:buSzTx/>
+                <a:buFontTx/>
+                <a:buNone/>
+                <a:tabLst/>
+                <a:defRPr/>
+              </a:pPr>
+              <a:r>
+                <a:rPr kumimoji="0" lang="en-GB" sz="1800" b="0" i="0" u="none" strike="noStrike" kern="1200" cap="none" spc="0" normalizeH="0" baseline="0" noProof="0" dirty="0">
+                  <a:ln>
+                    <a:noFill/>
+                  </a:ln>
+                  <a:solidFill>
+                    <a:prstClr val="black"/>
+                  </a:solidFill>
+                  <a:effectLst/>
+                  <a:uLnTx/>
+                  <a:uFillTx/>
+                  <a:latin typeface="Calibri" panose="020F0502020204030204"/>
+                  <a:ea typeface="+mn-ea"/>
+                  <a:cs typeface="+mn-cs"/>
+                </a:rPr>
+                <a:t>Date: 11/01/22 </a:t>
+              </a:r>
+            </a:p>
+          </p:txBody>
+        </p:sp>
+        <p:cxnSp>
+          <p:nvCxnSpPr>
+            <p:cNvPr id="11" name="Straight Connector 10">
+              <a:extLst>
+                <a:ext uri="{FF2B5EF4-FFF2-40B4-BE49-F238E27FC236}">
+                  <a16:creationId xmlns:a16="http://schemas.microsoft.com/office/drawing/2014/main" id="{F70ABCF3-BE60-426F-8C8C-059C854869C6}"/>
+                </a:ext>
+              </a:extLst>
+            </p:cNvPr>
+            <p:cNvCxnSpPr>
+              <a:cxnSpLocks/>
+            </p:cNvCxnSpPr>
+            <p:nvPr/>
+          </p:nvCxnSpPr>
+          <p:spPr>
+            <a:xfrm flipV="1">
+              <a:off x="4267202" y="93505"/>
+              <a:ext cx="1" cy="754394"/>
+            </a:xfrm>
+            <a:prstGeom prst="line">
+              <a:avLst/>
+            </a:prstGeom>
+            <a:ln w="19050">
+              <a:solidFill>
+                <a:srgbClr val="0072C6"/>
+              </a:solidFill>
+            </a:ln>
+          </p:spPr>
+          <p:style>
+            <a:lnRef idx="1">
+              <a:schemeClr val="accent1"/>
+            </a:lnRef>
+            <a:fillRef idx="0">
+              <a:schemeClr val="accent1"/>
+            </a:fillRef>
+            <a:effectRef idx="0">
+              <a:schemeClr val="accent1"/>
+            </a:effectRef>
+            <a:fontRef idx="minor">
+              <a:schemeClr val="tx1"/>
+            </a:fontRef>
+          </p:style>
+        </p:cxnSp>
+        <p:cxnSp>
+          <p:nvCxnSpPr>
+            <p:cNvPr id="15" name="Straight Connector 14">
+              <a:extLst>
+                <a:ext uri="{FF2B5EF4-FFF2-40B4-BE49-F238E27FC236}">
+                  <a16:creationId xmlns:a16="http://schemas.microsoft.com/office/drawing/2014/main" id="{D7F750D7-69E5-4FC3-AFB5-134C7587DE8B}"/>
+                </a:ext>
+              </a:extLst>
+            </p:cNvPr>
+            <p:cNvCxnSpPr>
+              <a:cxnSpLocks/>
+            </p:cNvCxnSpPr>
+            <p:nvPr/>
+          </p:nvCxnSpPr>
+          <p:spPr>
+            <a:xfrm flipV="1">
+              <a:off x="7154489" y="88317"/>
+              <a:ext cx="1" cy="754394"/>
+            </a:xfrm>
+            <a:prstGeom prst="line">
+              <a:avLst/>
+            </a:prstGeom>
+            <a:ln w="19050">
+              <a:solidFill>
+                <a:srgbClr val="0072C6"/>
+              </a:solidFill>
+            </a:ln>
+          </p:spPr>
+          <p:style>
+            <a:lnRef idx="1">
+              <a:schemeClr val="accent1"/>
+            </a:lnRef>
+            <a:fillRef idx="0">
+              <a:schemeClr val="accent1"/>
+            </a:fillRef>
+            <a:effectRef idx="0">
+              <a:schemeClr val="accent1"/>
+            </a:effectRef>
+            <a:fontRef idx="minor">
+              <a:schemeClr val="tx1"/>
+            </a:fontRef>
+          </p:style>
+        </p:cxnSp>
+        <p:cxnSp>
+          <p:nvCxnSpPr>
+            <p:cNvPr id="16" name="Straight Connector 15">
+              <a:extLst>
+                <a:ext uri="{FF2B5EF4-FFF2-40B4-BE49-F238E27FC236}">
+                  <a16:creationId xmlns:a16="http://schemas.microsoft.com/office/drawing/2014/main" id="{90F03633-4CAB-4B57-BF94-CF91E87AB7AE}"/>
+                </a:ext>
+              </a:extLst>
+            </p:cNvPr>
+            <p:cNvCxnSpPr>
+              <a:cxnSpLocks/>
+            </p:cNvCxnSpPr>
+            <p:nvPr/>
+          </p:nvCxnSpPr>
+          <p:spPr>
+            <a:xfrm flipV="1">
+              <a:off x="9491750" y="83129"/>
+              <a:ext cx="1" cy="754394"/>
+            </a:xfrm>
+            <a:prstGeom prst="line">
+              <a:avLst/>
+            </a:prstGeom>
+            <a:ln w="19050">
+              <a:solidFill>
+                <a:srgbClr val="0072C6"/>
+              </a:solidFill>
+            </a:ln>
+          </p:spPr>
+          <p:style>
+            <a:lnRef idx="1">
+              <a:schemeClr val="accent1"/>
+            </a:lnRef>
+            <a:fillRef idx="0">
+              <a:schemeClr val="accent1"/>
+            </a:fillRef>
+            <a:effectRef idx="0">
+              <a:schemeClr val="accent1"/>
+            </a:effectRef>
+            <a:fontRef idx="minor">
+              <a:schemeClr val="tx1"/>
+            </a:fontRef>
+          </p:style>
+        </p:cxnSp>
+      </p:grpSp>
+      <p:sp>
+        <p:nvSpPr>
+          <p:cNvPr id="19" name="Rectangle 18">
+            <a:extLst>
+              <a:ext uri="{FF2B5EF4-FFF2-40B4-BE49-F238E27FC236}">
+                <a16:creationId xmlns:a16="http://schemas.microsoft.com/office/drawing/2014/main" id="{ED545263-4F3E-40B3-B602-E17FBC18342A}"/>
+              </a:ext>
+            </a:extLst>
+          </p:cNvPr>
+          <p:cNvSpPr/>
+          <p:nvPr/>
+        </p:nvSpPr>
+        <p:spPr>
+          <a:xfrm>
+            <a:off x="269475" y="1074403"/>
+            <a:ext cx="11328358" cy="3347123"/>
+          </a:xfrm>
+          <a:prstGeom prst="rect">
+            <a:avLst/>
+          </a:prstGeom>
+          <a:noFill/>
+          <a:ln>
+            <a:noFill/>
+          </a:ln>
+        </p:spPr>
+        <p:style>
+          <a:lnRef idx="2">
+            <a:schemeClr val="accent1">
+              <a:shade val="50000"/>
+            </a:schemeClr>
+          </a:lnRef>
+          <a:fillRef idx="1">
+            <a:schemeClr val="accent1"/>
+          </a:fillRef>
+          <a:effectRef idx="0">
+            <a:schemeClr val="accent1"/>
+          </a:effectRef>
+          <a:fontRef idx="minor">
+            <a:schemeClr val="lt1"/>
+          </a:fontRef>
+        </p:style>
+        <p:txBody>
+          <a:bodyPr rtlCol="0" anchor="t"/>
+          <a:lstStyle/>
+          <a:p>
+            <a:pPr marL="0" marR="0" lvl="0" indent="0" algn="l" defTabSz="914400" rtl="0" eaLnBrk="1" fontAlgn="auto" latinLnBrk="0" hangingPunct="1">
+              <a:lnSpc>
+                <a:spcPct val="120000"/>
+              </a:lnSpc>
+              <a:spcBef>
+                <a:spcPts val="0"/>
+              </a:spcBef>
+              <a:spcAft>
+                <a:spcPts val="0"/>
+              </a:spcAft>
+              <a:buClrTx/>
+              <a:buSzTx/>
+              <a:buFontTx/>
+              <a:buNone/>
+              <a:tabLst/>
+              <a:defRPr/>
+            </a:pPr>
+            <a:r>
+              <a:rPr kumimoji="0" lang="en-GB" sz="1600" b="1" i="0" u="none" strike="noStrike" kern="1200" cap="none" spc="0" normalizeH="0" baseline="0" noProof="0" dirty="0">
+                <a:ln>
+                  <a:noFill/>
+                </a:ln>
+                <a:solidFill>
+                  <a:prstClr val="black"/>
+                </a:solidFill>
+                <a:effectLst/>
+                <a:uLnTx/>
+                <a:uFillTx/>
+                <a:latin typeface="Calibri" panose="020F0502020204030204"/>
+                <a:ea typeface="+mn-ea"/>
+                <a:cs typeface="+mn-cs"/>
+              </a:rPr>
+              <a:t>History of SQL</a:t>
+            </a:r>
+          </a:p>
+          <a:p>
+            <a:pPr marL="0" marR="0" lvl="0" indent="0" algn="l" defTabSz="914400" rtl="0" eaLnBrk="1" fontAlgn="auto" latinLnBrk="0" hangingPunct="1">
+              <a:lnSpc>
+                <a:spcPct val="120000"/>
+              </a:lnSpc>
+              <a:spcBef>
+                <a:spcPts val="0"/>
+              </a:spcBef>
+              <a:spcAft>
+                <a:spcPts val="0"/>
+              </a:spcAft>
+              <a:buClrTx/>
+              <a:buSzTx/>
+              <a:buFontTx/>
+              <a:buNone/>
+              <a:tabLst/>
+              <a:defRPr/>
+            </a:pPr>
+            <a:endParaRPr lang="en-GB" sz="1600" b="1" dirty="0">
+              <a:solidFill>
+                <a:prstClr val="black"/>
+              </a:solidFill>
+              <a:latin typeface="Calibri" panose="020F0502020204030204"/>
+            </a:endParaRPr>
+          </a:p>
+          <a:p>
+            <a:pPr marL="0" marR="0" lvl="0" indent="0" algn="l" defTabSz="914400" rtl="0" eaLnBrk="1" fontAlgn="auto" latinLnBrk="0" hangingPunct="1">
+              <a:lnSpc>
+                <a:spcPct val="120000"/>
+              </a:lnSpc>
+              <a:spcBef>
+                <a:spcPts val="0"/>
+              </a:spcBef>
+              <a:spcAft>
+                <a:spcPts val="0"/>
+              </a:spcAft>
+              <a:buClrTx/>
+              <a:buSzTx/>
+              <a:buFontTx/>
+              <a:buNone/>
+              <a:tabLst/>
+              <a:defRPr/>
+            </a:pPr>
+            <a:r>
+              <a:rPr kumimoji="0" lang="en-GB" sz="1600" i="0" u="none" strike="noStrike" kern="1200" cap="none" spc="0" normalizeH="0" baseline="0" noProof="0" dirty="0">
+                <a:ln>
+                  <a:noFill/>
+                </a:ln>
+                <a:solidFill>
+                  <a:prstClr val="black"/>
+                </a:solidFill>
+                <a:effectLst/>
+                <a:uLnTx/>
+                <a:uFillTx/>
+                <a:latin typeface="Calibri" panose="020F0502020204030204"/>
+                <a:ea typeface="+mn-ea"/>
+                <a:cs typeface="+mn-cs"/>
+              </a:rPr>
+              <a:t>SQL or Sequel? Originally it was called Sequel and stood for structured English query language, but had to change its name due to copywrite conflict. So now its simply structured query language. </a:t>
+            </a:r>
+          </a:p>
+          <a:p>
+            <a:pPr marL="0" marR="0" lvl="0" indent="0" algn="l" defTabSz="914400" rtl="0" eaLnBrk="1" fontAlgn="auto" latinLnBrk="0" hangingPunct="1">
+              <a:lnSpc>
+                <a:spcPct val="120000"/>
+              </a:lnSpc>
+              <a:spcBef>
+                <a:spcPts val="0"/>
+              </a:spcBef>
+              <a:spcAft>
+                <a:spcPts val="0"/>
+              </a:spcAft>
+              <a:buClrTx/>
+              <a:buSzTx/>
+              <a:buFontTx/>
+              <a:buNone/>
+              <a:tabLst/>
+              <a:defRPr/>
+            </a:pPr>
+            <a:endParaRPr lang="en-GB" sz="1600" dirty="0">
+              <a:solidFill>
+                <a:prstClr val="black"/>
+              </a:solidFill>
+              <a:latin typeface="Calibri" panose="020F0502020204030204"/>
+            </a:endParaRPr>
+          </a:p>
+          <a:p>
+            <a:pPr marL="0" marR="0" lvl="0" indent="0" algn="l" defTabSz="914400" rtl="0" eaLnBrk="1" fontAlgn="auto" latinLnBrk="0" hangingPunct="1">
+              <a:lnSpc>
+                <a:spcPct val="120000"/>
+              </a:lnSpc>
+              <a:spcBef>
+                <a:spcPts val="0"/>
+              </a:spcBef>
+              <a:spcAft>
+                <a:spcPts val="0"/>
+              </a:spcAft>
+              <a:buClrTx/>
+              <a:buSzTx/>
+              <a:buFontTx/>
+              <a:buNone/>
+              <a:tabLst/>
+              <a:defRPr/>
+            </a:pPr>
+            <a:r>
+              <a:rPr lang="en-GB" sz="1600" dirty="0">
+                <a:solidFill>
+                  <a:prstClr val="black"/>
+                </a:solidFill>
+                <a:latin typeface="Calibri" panose="020F0502020204030204"/>
+              </a:rPr>
+              <a:t>Originally developed by IBM in the 1980s.</a:t>
+            </a:r>
+          </a:p>
+        </p:txBody>
+      </p:sp>
+    </p:spTree>
+    <p:extLst>
+      <p:ext uri="{BB962C8B-B14F-4D97-AF65-F5344CB8AC3E}">
+        <p14:creationId xmlns:p14="http://schemas.microsoft.com/office/powerpoint/2010/main" val="3007227358"/>
+      </p:ext>
+    </p:extLst>
+  </p:cSld>
+  <p:clrMapOvr>
+    <a:masterClrMapping/>
+  </p:clrMapOvr>
+</p:sld>
+</file>
+
+<file path=ppt/slides/slide9.xml><?xml version="1.0" encoding="utf-8"?>
+<p:sld xmlns:a="http://schemas.openxmlformats.org/drawingml/2006/main" xmlns:r="http://schemas.openxmlformats.org/officeDocument/2006/relationships" xmlns:p="http://schemas.openxmlformats.org/presentationml/2006/main">
+  <p:cSld>
+    <p:spTree>
+      <p:nvGrpSpPr>
+        <p:cNvPr id="1" name=""/>
+        <p:cNvGrpSpPr/>
+        <p:nvPr/>
+      </p:nvGrpSpPr>
+      <p:grpSpPr>
+        <a:xfrm>
+          <a:off x="0" y="0"/>
+          <a:ext cx="0" cy="0"/>
+          <a:chOff x="0" y="0"/>
+          <a:chExt cx="0" cy="0"/>
+        </a:xfrm>
+      </p:grpSpPr>
+      <p:pic>
+        <p:nvPicPr>
+          <p:cNvPr id="2" name="Picture 2" descr="What is SQL? - Tech Monitor">
+            <a:extLst>
+              <a:ext uri="{FF2B5EF4-FFF2-40B4-BE49-F238E27FC236}">
+                <a16:creationId xmlns:a16="http://schemas.microsoft.com/office/drawing/2014/main" id="{6B52F4A0-16E8-43E9-BF09-6D67DF948D7E}"/>
+              </a:ext>
+            </a:extLst>
+          </p:cNvPr>
+          <p:cNvPicPr>
+            <a:picLocks noChangeAspect="1" noChangeArrowheads="1"/>
+          </p:cNvPicPr>
+          <p:nvPr/>
+        </p:nvPicPr>
+        <p:blipFill rotWithShape="1">
+          <a:blip r:embed="rId2">
+            <a:extLst>
+              <a:ext uri="{28A0092B-C50C-407E-A947-70E740481C1C}">
+                <a14:useLocalDpi xmlns:a14="http://schemas.microsoft.com/office/drawing/2010/main" val="0"/>
+              </a:ext>
+            </a:extLst>
+          </a:blip>
+          <a:srcRect l="26148" r="27610"/>
+          <a:stretch/>
+        </p:blipFill>
+        <p:spPr bwMode="auto">
+          <a:xfrm>
+            <a:off x="136857" y="84112"/>
+            <a:ext cx="689376" cy="782667"/>
+          </a:xfrm>
+          <a:prstGeom prst="rect">
+            <a:avLst/>
+          </a:prstGeom>
+          <a:noFill/>
+          <a:extLst>
+            <a:ext uri="{909E8E84-426E-40DD-AFC4-6F175D3DCCD1}">
+              <a14:hiddenFill xmlns:a14="http://schemas.microsoft.com/office/drawing/2010/main">
+                <a:solidFill>
+                  <a:srgbClr val="FFFFFF"/>
+                </a:solidFill>
+              </a14:hiddenFill>
+            </a:ext>
+          </a:extLst>
+        </p:spPr>
+      </p:pic>
       <p:cxnSp>
         <p:nvCxnSpPr>
           <p:cNvPr id="5" name="Straight Connector 4">
@@ -8056,951 +11375,6 @@
     <p:extLst>
       <p:ext uri="{BB962C8B-B14F-4D97-AF65-F5344CB8AC3E}">
         <p14:creationId xmlns:p14="http://schemas.microsoft.com/office/powerpoint/2010/main" val="1990716604"/>
-      </p:ext>
-    </p:extLst>
-  </p:cSld>
-  <p:clrMapOvr>
-    <a:masterClrMapping/>
-  </p:clrMapOvr>
-</p:sld>
-</file>
-
-<file path=ppt/slides/slide7.xml><?xml version="1.0" encoding="utf-8"?>
-<p:sld xmlns:a="http://schemas.openxmlformats.org/drawingml/2006/main" xmlns:r="http://schemas.openxmlformats.org/officeDocument/2006/relationships" xmlns:p="http://schemas.openxmlformats.org/presentationml/2006/main">
-  <p:cSld>
-    <p:spTree>
-      <p:nvGrpSpPr>
-        <p:cNvPr id="1" name=""/>
-        <p:cNvGrpSpPr/>
-        <p:nvPr/>
-      </p:nvGrpSpPr>
-      <p:grpSpPr>
-        <a:xfrm>
-          <a:off x="0" y="0"/>
-          <a:ext cx="0" cy="0"/>
-          <a:chOff x="0" y="0"/>
-          <a:chExt cx="0" cy="0"/>
-        </a:xfrm>
-      </p:grpSpPr>
-      <p:pic>
-        <p:nvPicPr>
-          <p:cNvPr id="2" name="Picture 2" descr="What is SQL? - Tech Monitor">
-            <a:extLst>
-              <a:ext uri="{FF2B5EF4-FFF2-40B4-BE49-F238E27FC236}">
-                <a16:creationId xmlns:a16="http://schemas.microsoft.com/office/drawing/2014/main" id="{6B52F4A0-16E8-43E9-BF09-6D67DF948D7E}"/>
-              </a:ext>
-            </a:extLst>
-          </p:cNvPr>
-          <p:cNvPicPr>
-            <a:picLocks noChangeAspect="1" noChangeArrowheads="1"/>
-          </p:cNvPicPr>
-          <p:nvPr/>
-        </p:nvPicPr>
-        <p:blipFill rotWithShape="1">
-          <a:blip r:embed="rId2">
-            <a:extLst>
-              <a:ext uri="{28A0092B-C50C-407E-A947-70E740481C1C}">
-                <a14:useLocalDpi xmlns:a14="http://schemas.microsoft.com/office/drawing/2010/main" val="0"/>
-              </a:ext>
-            </a:extLst>
-          </a:blip>
-          <a:srcRect l="26148" r="27610"/>
-          <a:stretch/>
-        </p:blipFill>
-        <p:spPr bwMode="auto">
-          <a:xfrm>
-            <a:off x="136857" y="84112"/>
-            <a:ext cx="689376" cy="782667"/>
-          </a:xfrm>
-          <a:prstGeom prst="rect">
-            <a:avLst/>
-          </a:prstGeom>
-          <a:noFill/>
-          <a:extLst>
-            <a:ext uri="{909E8E84-426E-40DD-AFC4-6F175D3DCCD1}">
-              <a14:hiddenFill xmlns:a14="http://schemas.microsoft.com/office/drawing/2010/main">
-                <a:solidFill>
-                  <a:srgbClr val="FFFFFF"/>
-                </a:solidFill>
-              </a14:hiddenFill>
-            </a:ext>
-          </a:extLst>
-        </p:spPr>
-      </p:pic>
-      <p:cxnSp>
-        <p:nvCxnSpPr>
-          <p:cNvPr id="5" name="Straight Connector 4">
-            <a:extLst>
-              <a:ext uri="{FF2B5EF4-FFF2-40B4-BE49-F238E27FC236}">
-                <a16:creationId xmlns:a16="http://schemas.microsoft.com/office/drawing/2014/main" id="{A8BE4EF8-406C-4035-940C-AB752B29BA18}"/>
-              </a:ext>
-            </a:extLst>
-          </p:cNvPr>
-          <p:cNvCxnSpPr/>
-          <p:nvPr/>
-        </p:nvCxnSpPr>
-        <p:spPr>
-          <a:xfrm>
-            <a:off x="99755" y="955963"/>
-            <a:ext cx="11953701" cy="0"/>
-          </a:xfrm>
-          <a:prstGeom prst="line">
-            <a:avLst/>
-          </a:prstGeom>
-          <a:ln w="19050">
-            <a:solidFill>
-              <a:srgbClr val="0072C6"/>
-            </a:solidFill>
-          </a:ln>
-        </p:spPr>
-        <p:style>
-          <a:lnRef idx="1">
-            <a:schemeClr val="accent1"/>
-          </a:lnRef>
-          <a:fillRef idx="0">
-            <a:schemeClr val="accent1"/>
-          </a:fillRef>
-          <a:effectRef idx="0">
-            <a:schemeClr val="accent1"/>
-          </a:effectRef>
-          <a:fontRef idx="minor">
-            <a:schemeClr val="tx1"/>
-          </a:fontRef>
-        </p:style>
-      </p:cxnSp>
-      <p:sp>
-        <p:nvSpPr>
-          <p:cNvPr id="6" name="TextBox 5">
-            <a:extLst>
-              <a:ext uri="{FF2B5EF4-FFF2-40B4-BE49-F238E27FC236}">
-                <a16:creationId xmlns:a16="http://schemas.microsoft.com/office/drawing/2014/main" id="{4A5E75BC-B6AC-4138-AB81-9DEC0096C5A8}"/>
-              </a:ext>
-            </a:extLst>
-          </p:cNvPr>
-          <p:cNvSpPr txBox="1"/>
-          <p:nvPr/>
-        </p:nvSpPr>
-        <p:spPr>
-          <a:xfrm>
-            <a:off x="914402" y="191193"/>
-            <a:ext cx="3483032" cy="646331"/>
-          </a:xfrm>
-          <a:prstGeom prst="rect">
-            <a:avLst/>
-          </a:prstGeom>
-          <a:noFill/>
-        </p:spPr>
-        <p:txBody>
-          <a:bodyPr wrap="square" rtlCol="0">
-            <a:spAutoFit/>
-          </a:bodyPr>
-          <a:lstStyle/>
-          <a:p>
-            <a:pPr marL="0" marR="0" lvl="0" indent="0" algn="l" defTabSz="914400" rtl="0" eaLnBrk="1" fontAlgn="auto" latinLnBrk="0" hangingPunct="1">
-              <a:lnSpc>
-                <a:spcPct val="100000"/>
-              </a:lnSpc>
-              <a:spcBef>
-                <a:spcPts val="0"/>
-              </a:spcBef>
-              <a:spcAft>
-                <a:spcPts val="0"/>
-              </a:spcAft>
-              <a:buClrTx/>
-              <a:buSzTx/>
-              <a:buFontTx/>
-              <a:buNone/>
-              <a:tabLst/>
-              <a:defRPr/>
-            </a:pPr>
-            <a:r>
-              <a:rPr kumimoji="0" lang="en-GB" sz="1800" b="0" i="0" u="none" strike="noStrike" kern="1200" cap="none" spc="0" normalizeH="0" baseline="0" noProof="0" dirty="0">
-                <a:ln>
-                  <a:noFill/>
-                </a:ln>
-                <a:solidFill>
-                  <a:prstClr val="black"/>
-                </a:solidFill>
-                <a:effectLst/>
-                <a:uLnTx/>
-                <a:uFillTx/>
-                <a:latin typeface="Calibri" panose="020F0502020204030204"/>
-                <a:ea typeface="+mn-ea"/>
-                <a:cs typeface="+mn-cs"/>
-              </a:rPr>
-              <a:t>Complete SQL and Database Bootcamp: Zero to Mastery</a:t>
-            </a:r>
-          </a:p>
-        </p:txBody>
-      </p:sp>
-      <p:sp>
-        <p:nvSpPr>
-          <p:cNvPr id="8" name="TextBox 7">
-            <a:extLst>
-              <a:ext uri="{FF2B5EF4-FFF2-40B4-BE49-F238E27FC236}">
-                <a16:creationId xmlns:a16="http://schemas.microsoft.com/office/drawing/2014/main" id="{C61B684E-FDA7-4625-9CC3-79C17CC59ED7}"/>
-              </a:ext>
-            </a:extLst>
-          </p:cNvPr>
-          <p:cNvSpPr txBox="1"/>
-          <p:nvPr/>
-        </p:nvSpPr>
-        <p:spPr>
-          <a:xfrm>
-            <a:off x="246888" y="2479578"/>
-            <a:ext cx="11576304" cy="1569660"/>
-          </a:xfrm>
-          <a:prstGeom prst="rect">
-            <a:avLst/>
-          </a:prstGeom>
-          <a:noFill/>
-        </p:spPr>
-        <p:txBody>
-          <a:bodyPr wrap="square" rtlCol="0">
-            <a:spAutoFit/>
-          </a:bodyPr>
-          <a:lstStyle/>
-          <a:p>
-            <a:pPr marL="0" marR="0" lvl="0" indent="0" algn="ctr" defTabSz="914400" rtl="0" eaLnBrk="1" fontAlgn="auto" latinLnBrk="0" hangingPunct="1">
-              <a:lnSpc>
-                <a:spcPct val="100000"/>
-              </a:lnSpc>
-              <a:spcBef>
-                <a:spcPts val="0"/>
-              </a:spcBef>
-              <a:spcAft>
-                <a:spcPts val="0"/>
-              </a:spcAft>
-              <a:buClrTx/>
-              <a:buSzTx/>
-              <a:buFontTx/>
-              <a:buNone/>
-              <a:tabLst/>
-              <a:defRPr/>
-            </a:pPr>
-            <a:r>
-              <a:rPr kumimoji="0" lang="en-GB" sz="3200" i="0" u="none" strike="noStrike" kern="1200" cap="none" spc="0" normalizeH="0" baseline="0" noProof="0" dirty="0">
-                <a:ln>
-                  <a:noFill/>
-                </a:ln>
-                <a:solidFill>
-                  <a:prstClr val="black"/>
-                </a:solidFill>
-                <a:effectLst/>
-                <a:uLnTx/>
-                <a:uFillTx/>
-                <a:latin typeface="Calibri" panose="020F0502020204030204"/>
-                <a:ea typeface="+mn-ea"/>
-                <a:cs typeface="+mn-cs"/>
-              </a:rPr>
-              <a:t>Section 5</a:t>
-            </a:r>
-          </a:p>
-          <a:p>
-            <a:pPr marL="0" marR="0" lvl="0" indent="0" algn="ctr" defTabSz="914400" rtl="0" eaLnBrk="1" fontAlgn="auto" latinLnBrk="0" hangingPunct="1">
-              <a:lnSpc>
-                <a:spcPct val="100000"/>
-              </a:lnSpc>
-              <a:spcBef>
-                <a:spcPts val="0"/>
-              </a:spcBef>
-              <a:spcAft>
-                <a:spcPts val="0"/>
-              </a:spcAft>
-              <a:buClrTx/>
-              <a:buSzTx/>
-              <a:buFontTx/>
-              <a:buNone/>
-              <a:tabLst/>
-              <a:defRPr/>
-            </a:pPr>
-            <a:endParaRPr kumimoji="0" lang="en-GB" sz="3200" b="1" i="0" u="none" strike="noStrike" kern="1200" cap="none" spc="0" normalizeH="0" baseline="0" noProof="0" dirty="0">
-              <a:ln>
-                <a:noFill/>
-              </a:ln>
-              <a:solidFill>
-                <a:prstClr val="black"/>
-              </a:solidFill>
-              <a:effectLst/>
-              <a:uLnTx/>
-              <a:uFillTx/>
-              <a:latin typeface="Calibri" panose="020F0502020204030204"/>
-              <a:ea typeface="+mn-ea"/>
-              <a:cs typeface="+mn-cs"/>
-            </a:endParaRPr>
-          </a:p>
-          <a:p>
-            <a:pPr marL="0" marR="0" lvl="0" indent="0" algn="ctr" defTabSz="914400" rtl="0" eaLnBrk="1" fontAlgn="auto" latinLnBrk="0" hangingPunct="1">
-              <a:lnSpc>
-                <a:spcPct val="100000"/>
-              </a:lnSpc>
-              <a:spcBef>
-                <a:spcPts val="0"/>
-              </a:spcBef>
-              <a:spcAft>
-                <a:spcPts val="0"/>
-              </a:spcAft>
-              <a:buClrTx/>
-              <a:buSzTx/>
-              <a:buFontTx/>
-              <a:buNone/>
-              <a:tabLst/>
-              <a:defRPr/>
-            </a:pPr>
-            <a:r>
-              <a:rPr kumimoji="0" lang="en-GB" sz="3200" b="1" i="0" u="none" strike="noStrike" kern="1200" cap="none" spc="0" normalizeH="0" baseline="0" noProof="0" dirty="0">
-                <a:ln>
-                  <a:noFill/>
-                </a:ln>
-                <a:solidFill>
-                  <a:prstClr val="black"/>
-                </a:solidFill>
-                <a:effectLst/>
-                <a:uLnTx/>
-                <a:uFillTx/>
-                <a:latin typeface="Calibri" panose="020F0502020204030204"/>
-                <a:ea typeface="+mn-ea"/>
-                <a:cs typeface="+mn-cs"/>
-              </a:rPr>
-              <a:t>SQL Deep Dive</a:t>
-            </a:r>
-          </a:p>
-        </p:txBody>
-      </p:sp>
-    </p:spTree>
-    <p:extLst>
-      <p:ext uri="{BB962C8B-B14F-4D97-AF65-F5344CB8AC3E}">
-        <p14:creationId xmlns:p14="http://schemas.microsoft.com/office/powerpoint/2010/main" val="3456612687"/>
-      </p:ext>
-    </p:extLst>
-  </p:cSld>
-  <p:clrMapOvr>
-    <a:masterClrMapping/>
-  </p:clrMapOvr>
-</p:sld>
-</file>
-
-<file path=ppt/slides/slide8.xml><?xml version="1.0" encoding="utf-8"?>
-<p:sld xmlns:a="http://schemas.openxmlformats.org/drawingml/2006/main" xmlns:r="http://schemas.openxmlformats.org/officeDocument/2006/relationships" xmlns:p="http://schemas.openxmlformats.org/presentationml/2006/main">
-  <p:cSld>
-    <p:spTree>
-      <p:nvGrpSpPr>
-        <p:cNvPr id="1" name=""/>
-        <p:cNvGrpSpPr/>
-        <p:nvPr/>
-      </p:nvGrpSpPr>
-      <p:grpSpPr>
-        <a:xfrm>
-          <a:off x="0" y="0"/>
-          <a:ext cx="0" cy="0"/>
-          <a:chOff x="0" y="0"/>
-          <a:chExt cx="0" cy="0"/>
-        </a:xfrm>
-      </p:grpSpPr>
-      <p:pic>
-        <p:nvPicPr>
-          <p:cNvPr id="2" name="Picture 2" descr="What is SQL? - Tech Monitor">
-            <a:extLst>
-              <a:ext uri="{FF2B5EF4-FFF2-40B4-BE49-F238E27FC236}">
-                <a16:creationId xmlns:a16="http://schemas.microsoft.com/office/drawing/2014/main" id="{6B52F4A0-16E8-43E9-BF09-6D67DF948D7E}"/>
-              </a:ext>
-            </a:extLst>
-          </p:cNvPr>
-          <p:cNvPicPr>
-            <a:picLocks noChangeAspect="1" noChangeArrowheads="1"/>
-          </p:cNvPicPr>
-          <p:nvPr/>
-        </p:nvPicPr>
-        <p:blipFill rotWithShape="1">
-          <a:blip r:embed="rId2">
-            <a:extLst>
-              <a:ext uri="{28A0092B-C50C-407E-A947-70E740481C1C}">
-                <a14:useLocalDpi xmlns:a14="http://schemas.microsoft.com/office/drawing/2010/main" val="0"/>
-              </a:ext>
-            </a:extLst>
-          </a:blip>
-          <a:srcRect l="26148" r="27610"/>
-          <a:stretch/>
-        </p:blipFill>
-        <p:spPr bwMode="auto">
-          <a:xfrm>
-            <a:off x="136857" y="84112"/>
-            <a:ext cx="689376" cy="782667"/>
-          </a:xfrm>
-          <a:prstGeom prst="rect">
-            <a:avLst/>
-          </a:prstGeom>
-          <a:noFill/>
-          <a:extLst>
-            <a:ext uri="{909E8E84-426E-40DD-AFC4-6F175D3DCCD1}">
-              <a14:hiddenFill xmlns:a14="http://schemas.microsoft.com/office/drawing/2010/main">
-                <a:solidFill>
-                  <a:srgbClr val="FFFFFF"/>
-                </a:solidFill>
-              </a14:hiddenFill>
-            </a:ext>
-          </a:extLst>
-        </p:spPr>
-      </p:pic>
-      <p:cxnSp>
-        <p:nvCxnSpPr>
-          <p:cNvPr id="5" name="Straight Connector 4">
-            <a:extLst>
-              <a:ext uri="{FF2B5EF4-FFF2-40B4-BE49-F238E27FC236}">
-                <a16:creationId xmlns:a16="http://schemas.microsoft.com/office/drawing/2014/main" id="{A8BE4EF8-406C-4035-940C-AB752B29BA18}"/>
-              </a:ext>
-            </a:extLst>
-          </p:cNvPr>
-          <p:cNvCxnSpPr/>
-          <p:nvPr/>
-        </p:nvCxnSpPr>
-        <p:spPr>
-          <a:xfrm>
-            <a:off x="99755" y="955963"/>
-            <a:ext cx="11953701" cy="0"/>
-          </a:xfrm>
-          <a:prstGeom prst="line">
-            <a:avLst/>
-          </a:prstGeom>
-          <a:ln w="19050">
-            <a:solidFill>
-              <a:srgbClr val="0072C6"/>
-            </a:solidFill>
-          </a:ln>
-        </p:spPr>
-        <p:style>
-          <a:lnRef idx="1">
-            <a:schemeClr val="accent1"/>
-          </a:lnRef>
-          <a:fillRef idx="0">
-            <a:schemeClr val="accent1"/>
-          </a:fillRef>
-          <a:effectRef idx="0">
-            <a:schemeClr val="accent1"/>
-          </a:effectRef>
-          <a:fontRef idx="minor">
-            <a:schemeClr val="tx1"/>
-          </a:fontRef>
-        </p:style>
-      </p:cxnSp>
-      <p:sp>
-        <p:nvSpPr>
-          <p:cNvPr id="6" name="TextBox 5">
-            <a:extLst>
-              <a:ext uri="{FF2B5EF4-FFF2-40B4-BE49-F238E27FC236}">
-                <a16:creationId xmlns:a16="http://schemas.microsoft.com/office/drawing/2014/main" id="{4A5E75BC-B6AC-4138-AB81-9DEC0096C5A8}"/>
-              </a:ext>
-            </a:extLst>
-          </p:cNvPr>
-          <p:cNvSpPr txBox="1"/>
-          <p:nvPr/>
-        </p:nvSpPr>
-        <p:spPr>
-          <a:xfrm>
-            <a:off x="914402" y="191193"/>
-            <a:ext cx="3483032" cy="646331"/>
-          </a:xfrm>
-          <a:prstGeom prst="rect">
-            <a:avLst/>
-          </a:prstGeom>
-          <a:noFill/>
-        </p:spPr>
-        <p:txBody>
-          <a:bodyPr wrap="square" rtlCol="0">
-            <a:spAutoFit/>
-          </a:bodyPr>
-          <a:lstStyle/>
-          <a:p>
-            <a:pPr marL="0" marR="0" lvl="0" indent="0" algn="l" defTabSz="914400" rtl="0" eaLnBrk="1" fontAlgn="auto" latinLnBrk="0" hangingPunct="1">
-              <a:lnSpc>
-                <a:spcPct val="100000"/>
-              </a:lnSpc>
-              <a:spcBef>
-                <a:spcPts val="0"/>
-              </a:spcBef>
-              <a:spcAft>
-                <a:spcPts val="0"/>
-              </a:spcAft>
-              <a:buClrTx/>
-              <a:buSzTx/>
-              <a:buFontTx/>
-              <a:buNone/>
-              <a:tabLst/>
-              <a:defRPr/>
-            </a:pPr>
-            <a:r>
-              <a:rPr kumimoji="0" lang="en-GB" sz="1800" b="0" i="0" u="none" strike="noStrike" kern="1200" cap="none" spc="0" normalizeH="0" baseline="0" noProof="0" dirty="0">
-                <a:ln>
-                  <a:noFill/>
-                </a:ln>
-                <a:solidFill>
-                  <a:prstClr val="black"/>
-                </a:solidFill>
-                <a:effectLst/>
-                <a:uLnTx/>
-                <a:uFillTx/>
-                <a:latin typeface="Calibri" panose="020F0502020204030204"/>
-                <a:ea typeface="+mn-ea"/>
-                <a:cs typeface="+mn-cs"/>
-              </a:rPr>
-              <a:t>Complete SQL and Database Bootcamp: Zero to Mastery</a:t>
-            </a:r>
-          </a:p>
-        </p:txBody>
-      </p:sp>
-      <p:sp>
-        <p:nvSpPr>
-          <p:cNvPr id="8" name="TextBox 7">
-            <a:extLst>
-              <a:ext uri="{FF2B5EF4-FFF2-40B4-BE49-F238E27FC236}">
-                <a16:creationId xmlns:a16="http://schemas.microsoft.com/office/drawing/2014/main" id="{C61B684E-FDA7-4625-9CC3-79C17CC59ED7}"/>
-              </a:ext>
-            </a:extLst>
-          </p:cNvPr>
-          <p:cNvSpPr txBox="1"/>
-          <p:nvPr/>
-        </p:nvSpPr>
-        <p:spPr>
-          <a:xfrm>
-            <a:off x="246888" y="2479578"/>
-            <a:ext cx="11576304" cy="1569660"/>
-          </a:xfrm>
-          <a:prstGeom prst="rect">
-            <a:avLst/>
-          </a:prstGeom>
-          <a:noFill/>
-        </p:spPr>
-        <p:txBody>
-          <a:bodyPr wrap="square" rtlCol="0">
-            <a:spAutoFit/>
-          </a:bodyPr>
-          <a:lstStyle/>
-          <a:p>
-            <a:pPr marL="0" marR="0" lvl="0" indent="0" algn="ctr" defTabSz="914400" rtl="0" eaLnBrk="1" fontAlgn="auto" latinLnBrk="0" hangingPunct="1">
-              <a:lnSpc>
-                <a:spcPct val="100000"/>
-              </a:lnSpc>
-              <a:spcBef>
-                <a:spcPts val="0"/>
-              </a:spcBef>
-              <a:spcAft>
-                <a:spcPts val="0"/>
-              </a:spcAft>
-              <a:buClrTx/>
-              <a:buSzTx/>
-              <a:buFontTx/>
-              <a:buNone/>
-              <a:tabLst/>
-              <a:defRPr/>
-            </a:pPr>
-            <a:r>
-              <a:rPr kumimoji="0" lang="en-GB" sz="3200" i="0" u="none" strike="noStrike" kern="1200" cap="none" spc="0" normalizeH="0" baseline="0" noProof="0" dirty="0">
-                <a:ln>
-                  <a:noFill/>
-                </a:ln>
-                <a:solidFill>
-                  <a:prstClr val="black"/>
-                </a:solidFill>
-                <a:effectLst/>
-                <a:uLnTx/>
-                <a:uFillTx/>
-                <a:latin typeface="Calibri" panose="020F0502020204030204"/>
-                <a:ea typeface="+mn-ea"/>
-                <a:cs typeface="+mn-cs"/>
-              </a:rPr>
-              <a:t>Section 6</a:t>
-            </a:r>
-          </a:p>
-          <a:p>
-            <a:pPr marL="0" marR="0" lvl="0" indent="0" algn="ctr" defTabSz="914400" rtl="0" eaLnBrk="1" fontAlgn="auto" latinLnBrk="0" hangingPunct="1">
-              <a:lnSpc>
-                <a:spcPct val="100000"/>
-              </a:lnSpc>
-              <a:spcBef>
-                <a:spcPts val="0"/>
-              </a:spcBef>
-              <a:spcAft>
-                <a:spcPts val="0"/>
-              </a:spcAft>
-              <a:buClrTx/>
-              <a:buSzTx/>
-              <a:buFontTx/>
-              <a:buNone/>
-              <a:tabLst/>
-              <a:defRPr/>
-            </a:pPr>
-            <a:endParaRPr kumimoji="0" lang="en-GB" sz="3200" b="1" i="0" u="none" strike="noStrike" kern="1200" cap="none" spc="0" normalizeH="0" baseline="0" noProof="0" dirty="0">
-              <a:ln>
-                <a:noFill/>
-              </a:ln>
-              <a:solidFill>
-                <a:prstClr val="black"/>
-              </a:solidFill>
-              <a:effectLst/>
-              <a:uLnTx/>
-              <a:uFillTx/>
-              <a:latin typeface="Calibri" panose="020F0502020204030204"/>
-              <a:ea typeface="+mn-ea"/>
-              <a:cs typeface="+mn-cs"/>
-            </a:endParaRPr>
-          </a:p>
-          <a:p>
-            <a:pPr marL="0" marR="0" lvl="0" indent="0" algn="ctr" defTabSz="914400" rtl="0" eaLnBrk="1" fontAlgn="auto" latinLnBrk="0" hangingPunct="1">
-              <a:lnSpc>
-                <a:spcPct val="100000"/>
-              </a:lnSpc>
-              <a:spcBef>
-                <a:spcPts val="0"/>
-              </a:spcBef>
-              <a:spcAft>
-                <a:spcPts val="0"/>
-              </a:spcAft>
-              <a:buClrTx/>
-              <a:buSzTx/>
-              <a:buFontTx/>
-              <a:buNone/>
-              <a:tabLst/>
-              <a:defRPr/>
-            </a:pPr>
-            <a:r>
-              <a:rPr kumimoji="0" lang="en-GB" sz="3200" b="1" i="0" u="none" strike="noStrike" kern="1200" cap="none" spc="0" normalizeH="0" baseline="0" noProof="0" dirty="0">
-                <a:ln>
-                  <a:noFill/>
-                </a:ln>
-                <a:solidFill>
-                  <a:prstClr val="black"/>
-                </a:solidFill>
-                <a:effectLst/>
-                <a:uLnTx/>
-                <a:uFillTx/>
-                <a:latin typeface="Calibri" panose="020F0502020204030204"/>
-                <a:ea typeface="+mn-ea"/>
-                <a:cs typeface="+mn-cs"/>
-              </a:rPr>
-              <a:t>Advanced SQL</a:t>
-            </a:r>
-          </a:p>
-        </p:txBody>
-      </p:sp>
-    </p:spTree>
-    <p:extLst>
-      <p:ext uri="{BB962C8B-B14F-4D97-AF65-F5344CB8AC3E}">
-        <p14:creationId xmlns:p14="http://schemas.microsoft.com/office/powerpoint/2010/main" val="2985149612"/>
-      </p:ext>
-    </p:extLst>
-  </p:cSld>
-  <p:clrMapOvr>
-    <a:masterClrMapping/>
-  </p:clrMapOvr>
-</p:sld>
-</file>
-
-<file path=ppt/slides/slide9.xml><?xml version="1.0" encoding="utf-8"?>
-<p:sld xmlns:a="http://schemas.openxmlformats.org/drawingml/2006/main" xmlns:r="http://schemas.openxmlformats.org/officeDocument/2006/relationships" xmlns:p="http://schemas.openxmlformats.org/presentationml/2006/main">
-  <p:cSld>
-    <p:spTree>
-      <p:nvGrpSpPr>
-        <p:cNvPr id="1" name=""/>
-        <p:cNvGrpSpPr/>
-        <p:nvPr/>
-      </p:nvGrpSpPr>
-      <p:grpSpPr>
-        <a:xfrm>
-          <a:off x="0" y="0"/>
-          <a:ext cx="0" cy="0"/>
-          <a:chOff x="0" y="0"/>
-          <a:chExt cx="0" cy="0"/>
-        </a:xfrm>
-      </p:grpSpPr>
-      <p:pic>
-        <p:nvPicPr>
-          <p:cNvPr id="2" name="Picture 2" descr="What is SQL? - Tech Monitor">
-            <a:extLst>
-              <a:ext uri="{FF2B5EF4-FFF2-40B4-BE49-F238E27FC236}">
-                <a16:creationId xmlns:a16="http://schemas.microsoft.com/office/drawing/2014/main" id="{6B52F4A0-16E8-43E9-BF09-6D67DF948D7E}"/>
-              </a:ext>
-            </a:extLst>
-          </p:cNvPr>
-          <p:cNvPicPr>
-            <a:picLocks noChangeAspect="1" noChangeArrowheads="1"/>
-          </p:cNvPicPr>
-          <p:nvPr/>
-        </p:nvPicPr>
-        <p:blipFill rotWithShape="1">
-          <a:blip r:embed="rId2">
-            <a:extLst>
-              <a:ext uri="{28A0092B-C50C-407E-A947-70E740481C1C}">
-                <a14:useLocalDpi xmlns:a14="http://schemas.microsoft.com/office/drawing/2010/main" val="0"/>
-              </a:ext>
-            </a:extLst>
-          </a:blip>
-          <a:srcRect l="26148" r="27610"/>
-          <a:stretch/>
-        </p:blipFill>
-        <p:spPr bwMode="auto">
-          <a:xfrm>
-            <a:off x="136857" y="84112"/>
-            <a:ext cx="689376" cy="782667"/>
-          </a:xfrm>
-          <a:prstGeom prst="rect">
-            <a:avLst/>
-          </a:prstGeom>
-          <a:noFill/>
-          <a:extLst>
-            <a:ext uri="{909E8E84-426E-40DD-AFC4-6F175D3DCCD1}">
-              <a14:hiddenFill xmlns:a14="http://schemas.microsoft.com/office/drawing/2010/main">
-                <a:solidFill>
-                  <a:srgbClr val="FFFFFF"/>
-                </a:solidFill>
-              </a14:hiddenFill>
-            </a:ext>
-          </a:extLst>
-        </p:spPr>
-      </p:pic>
-      <p:cxnSp>
-        <p:nvCxnSpPr>
-          <p:cNvPr id="5" name="Straight Connector 4">
-            <a:extLst>
-              <a:ext uri="{FF2B5EF4-FFF2-40B4-BE49-F238E27FC236}">
-                <a16:creationId xmlns:a16="http://schemas.microsoft.com/office/drawing/2014/main" id="{A8BE4EF8-406C-4035-940C-AB752B29BA18}"/>
-              </a:ext>
-            </a:extLst>
-          </p:cNvPr>
-          <p:cNvCxnSpPr/>
-          <p:nvPr/>
-        </p:nvCxnSpPr>
-        <p:spPr>
-          <a:xfrm>
-            <a:off x="99755" y="955963"/>
-            <a:ext cx="11953701" cy="0"/>
-          </a:xfrm>
-          <a:prstGeom prst="line">
-            <a:avLst/>
-          </a:prstGeom>
-          <a:ln w="19050">
-            <a:solidFill>
-              <a:srgbClr val="0072C6"/>
-            </a:solidFill>
-          </a:ln>
-        </p:spPr>
-        <p:style>
-          <a:lnRef idx="1">
-            <a:schemeClr val="accent1"/>
-          </a:lnRef>
-          <a:fillRef idx="0">
-            <a:schemeClr val="accent1"/>
-          </a:fillRef>
-          <a:effectRef idx="0">
-            <a:schemeClr val="accent1"/>
-          </a:effectRef>
-          <a:fontRef idx="minor">
-            <a:schemeClr val="tx1"/>
-          </a:fontRef>
-        </p:style>
-      </p:cxnSp>
-      <p:sp>
-        <p:nvSpPr>
-          <p:cNvPr id="6" name="TextBox 5">
-            <a:extLst>
-              <a:ext uri="{FF2B5EF4-FFF2-40B4-BE49-F238E27FC236}">
-                <a16:creationId xmlns:a16="http://schemas.microsoft.com/office/drawing/2014/main" id="{4A5E75BC-B6AC-4138-AB81-9DEC0096C5A8}"/>
-              </a:ext>
-            </a:extLst>
-          </p:cNvPr>
-          <p:cNvSpPr txBox="1"/>
-          <p:nvPr/>
-        </p:nvSpPr>
-        <p:spPr>
-          <a:xfrm>
-            <a:off x="914402" y="191193"/>
-            <a:ext cx="3483032" cy="646331"/>
-          </a:xfrm>
-          <a:prstGeom prst="rect">
-            <a:avLst/>
-          </a:prstGeom>
-          <a:noFill/>
-        </p:spPr>
-        <p:txBody>
-          <a:bodyPr wrap="square" rtlCol="0">
-            <a:spAutoFit/>
-          </a:bodyPr>
-          <a:lstStyle/>
-          <a:p>
-            <a:pPr marL="0" marR="0" lvl="0" indent="0" algn="l" defTabSz="914400" rtl="0" eaLnBrk="1" fontAlgn="auto" latinLnBrk="0" hangingPunct="1">
-              <a:lnSpc>
-                <a:spcPct val="100000"/>
-              </a:lnSpc>
-              <a:spcBef>
-                <a:spcPts val="0"/>
-              </a:spcBef>
-              <a:spcAft>
-                <a:spcPts val="0"/>
-              </a:spcAft>
-              <a:buClrTx/>
-              <a:buSzTx/>
-              <a:buFontTx/>
-              <a:buNone/>
-              <a:tabLst/>
-              <a:defRPr/>
-            </a:pPr>
-            <a:r>
-              <a:rPr kumimoji="0" lang="en-GB" sz="1800" b="0" i="0" u="none" strike="noStrike" kern="1200" cap="none" spc="0" normalizeH="0" baseline="0" noProof="0" dirty="0">
-                <a:ln>
-                  <a:noFill/>
-                </a:ln>
-                <a:solidFill>
-                  <a:prstClr val="black"/>
-                </a:solidFill>
-                <a:effectLst/>
-                <a:uLnTx/>
-                <a:uFillTx/>
-                <a:latin typeface="Calibri" panose="020F0502020204030204"/>
-                <a:ea typeface="+mn-ea"/>
-                <a:cs typeface="+mn-cs"/>
-              </a:rPr>
-              <a:t>Complete SQL and Database Bootcamp: Zero to Mastery</a:t>
-            </a:r>
-          </a:p>
-        </p:txBody>
-      </p:sp>
-      <p:sp>
-        <p:nvSpPr>
-          <p:cNvPr id="8" name="TextBox 7">
-            <a:extLst>
-              <a:ext uri="{FF2B5EF4-FFF2-40B4-BE49-F238E27FC236}">
-                <a16:creationId xmlns:a16="http://schemas.microsoft.com/office/drawing/2014/main" id="{C61B684E-FDA7-4625-9CC3-79C17CC59ED7}"/>
-              </a:ext>
-            </a:extLst>
-          </p:cNvPr>
-          <p:cNvSpPr txBox="1"/>
-          <p:nvPr/>
-        </p:nvSpPr>
-        <p:spPr>
-          <a:xfrm>
-            <a:off x="246888" y="2479578"/>
-            <a:ext cx="11576304" cy="1569660"/>
-          </a:xfrm>
-          <a:prstGeom prst="rect">
-            <a:avLst/>
-          </a:prstGeom>
-          <a:noFill/>
-        </p:spPr>
-        <p:txBody>
-          <a:bodyPr wrap="square" rtlCol="0">
-            <a:spAutoFit/>
-          </a:bodyPr>
-          <a:lstStyle/>
-          <a:p>
-            <a:pPr marL="0" marR="0" lvl="0" indent="0" algn="ctr" defTabSz="914400" rtl="0" eaLnBrk="1" fontAlgn="auto" latinLnBrk="0" hangingPunct="1">
-              <a:lnSpc>
-                <a:spcPct val="100000"/>
-              </a:lnSpc>
-              <a:spcBef>
-                <a:spcPts val="0"/>
-              </a:spcBef>
-              <a:spcAft>
-                <a:spcPts val="0"/>
-              </a:spcAft>
-              <a:buClrTx/>
-              <a:buSzTx/>
-              <a:buFontTx/>
-              <a:buNone/>
-              <a:tabLst/>
-              <a:defRPr/>
-            </a:pPr>
-            <a:r>
-              <a:rPr kumimoji="0" lang="en-GB" sz="3200" i="0" u="none" strike="noStrike" kern="1200" cap="none" spc="0" normalizeH="0" baseline="0" noProof="0" dirty="0">
-                <a:ln>
-                  <a:noFill/>
-                </a:ln>
-                <a:solidFill>
-                  <a:prstClr val="black"/>
-                </a:solidFill>
-                <a:effectLst/>
-                <a:uLnTx/>
-                <a:uFillTx/>
-                <a:latin typeface="Calibri" panose="020F0502020204030204"/>
-                <a:ea typeface="+mn-ea"/>
-                <a:cs typeface="+mn-cs"/>
-              </a:rPr>
-              <a:t>Section 7</a:t>
-            </a:r>
-          </a:p>
-          <a:p>
-            <a:pPr marL="0" marR="0" lvl="0" indent="0" algn="ctr" defTabSz="914400" rtl="0" eaLnBrk="1" fontAlgn="auto" latinLnBrk="0" hangingPunct="1">
-              <a:lnSpc>
-                <a:spcPct val="100000"/>
-              </a:lnSpc>
-              <a:spcBef>
-                <a:spcPts val="0"/>
-              </a:spcBef>
-              <a:spcAft>
-                <a:spcPts val="0"/>
-              </a:spcAft>
-              <a:buClrTx/>
-              <a:buSzTx/>
-              <a:buFontTx/>
-              <a:buNone/>
-              <a:tabLst/>
-              <a:defRPr/>
-            </a:pPr>
-            <a:endParaRPr kumimoji="0" lang="en-GB" sz="3200" b="1" i="0" u="none" strike="noStrike" kern="1200" cap="none" spc="0" normalizeH="0" baseline="0" noProof="0" dirty="0">
-              <a:ln>
-                <a:noFill/>
-              </a:ln>
-              <a:solidFill>
-                <a:prstClr val="black"/>
-              </a:solidFill>
-              <a:effectLst/>
-              <a:uLnTx/>
-              <a:uFillTx/>
-              <a:latin typeface="Calibri" panose="020F0502020204030204"/>
-              <a:ea typeface="+mn-ea"/>
-              <a:cs typeface="+mn-cs"/>
-            </a:endParaRPr>
-          </a:p>
-          <a:p>
-            <a:pPr marL="0" marR="0" lvl="0" indent="0" algn="ctr" defTabSz="914400" rtl="0" eaLnBrk="1" fontAlgn="auto" latinLnBrk="0" hangingPunct="1">
-              <a:lnSpc>
-                <a:spcPct val="100000"/>
-              </a:lnSpc>
-              <a:spcBef>
-                <a:spcPts val="0"/>
-              </a:spcBef>
-              <a:spcAft>
-                <a:spcPts val="0"/>
-              </a:spcAft>
-              <a:buClrTx/>
-              <a:buSzTx/>
-              <a:buFontTx/>
-              <a:buNone/>
-              <a:tabLst/>
-              <a:defRPr/>
-            </a:pPr>
-            <a:r>
-              <a:rPr kumimoji="0" lang="en-GB" sz="3200" b="1" i="0" u="none" strike="noStrike" kern="1200" cap="none" spc="0" normalizeH="0" baseline="0" noProof="0" dirty="0">
-                <a:ln>
-                  <a:noFill/>
-                </a:ln>
-                <a:solidFill>
-                  <a:prstClr val="black"/>
-                </a:solidFill>
-                <a:effectLst/>
-                <a:uLnTx/>
-                <a:uFillTx/>
-                <a:latin typeface="Calibri" panose="020F0502020204030204"/>
-                <a:ea typeface="+mn-ea"/>
-                <a:cs typeface="+mn-cs"/>
-              </a:rPr>
-              <a:t>Database Management</a:t>
-            </a:r>
-          </a:p>
-        </p:txBody>
-      </p:sp>
-    </p:spTree>
-    <p:extLst>
-      <p:ext uri="{BB962C8B-B14F-4D97-AF65-F5344CB8AC3E}">
-        <p14:creationId xmlns:p14="http://schemas.microsoft.com/office/powerpoint/2010/main" val="1954899413"/>
       </p:ext>
     </p:extLst>
   </p:cSld>

</xml_diff>